<commit_message>
chapter 7 - arrays
</commit_message>
<xml_diff>
--- a/Documents/Chapter 7/Arrays/Arrays.pptx
+++ b/Documents/Chapter 7/Arrays/Arrays.pptx
@@ -7,6 +7,17 @@
   <p:sldIdLst>
     <p:sldId id="256" r:id="rId2"/>
     <p:sldId id="257" r:id="rId3"/>
+    <p:sldId id="258" r:id="rId4"/>
+    <p:sldId id="259" r:id="rId5"/>
+    <p:sldId id="260" r:id="rId6"/>
+    <p:sldId id="261" r:id="rId7"/>
+    <p:sldId id="262" r:id="rId8"/>
+    <p:sldId id="263" r:id="rId9"/>
+    <p:sldId id="264" r:id="rId10"/>
+    <p:sldId id="265" r:id="rId11"/>
+    <p:sldId id="266" r:id="rId12"/>
+    <p:sldId id="267" r:id="rId13"/>
+    <p:sldId id="268" r:id="rId14"/>
   </p:sldIdLst>
   <p:sldSz cx="12192000" cy="6858000"/>
   <p:notesSz cx="6858000" cy="9144000"/>
@@ -12649,6 +12660,298 @@
               <a:buFont typeface="Arial" panose="020B0604020202020204" pitchFamily="34" charset="0"/>
               <a:buChar char="•"/>
             </a:pPr>
+            <a:r>
+              <a:rPr lang="en-US" sz="1800" dirty="0">
+                <a:latin typeface="Tahoma" panose="020B0604030504040204" pitchFamily="34" charset="0"/>
+                <a:ea typeface="Tahoma" panose="020B0604030504040204" pitchFamily="34" charset="0"/>
+                <a:cs typeface="Tahoma" panose="020B0604030504040204" pitchFamily="34" charset="0"/>
+              </a:rPr>
+              <a:t>Construction and Indexing</a:t>
+            </a:r>
+            <a:endParaRPr lang="fa-IR" sz="1800" dirty="0">
+              <a:latin typeface="Tahoma" panose="020B0604030504040204" pitchFamily="34" charset="0"/>
+              <a:ea typeface="Tahoma" panose="020B0604030504040204" pitchFamily="34" charset="0"/>
+              <a:cs typeface="Tahoma" panose="020B0604030504040204" pitchFamily="34" charset="0"/>
+            </a:endParaRPr>
+          </a:p>
+          <a:p>
+            <a:pPr marL="285750" indent="-285750">
+              <a:buFont typeface="Arial" panose="020B0604020202020204" pitchFamily="34" charset="0"/>
+              <a:buChar char="•"/>
+            </a:pPr>
+            <a:r>
+              <a:rPr lang="en-US" sz="1800" kern="1200" baseline="0" dirty="0">
+                <a:solidFill>
+                  <a:srgbClr val="FFFFFF"/>
+                </a:solidFill>
+                <a:effectLst>
+                  <a:outerShdw blurRad="177800" dist="38100" dir="2700000" algn="tl" rotWithShape="0">
+                    <a:srgbClr val="000000">
+                      <a:alpha val="24000"/>
+                    </a:srgbClr>
+                  </a:outerShdw>
+                </a:effectLst>
+                <a:latin typeface="Tahoma" panose="020B0604030504040204" pitchFamily="34" charset="0"/>
+                <a:ea typeface="+mj-ea"/>
+                <a:cs typeface="B Lotus" panose="00000400000000000000" pitchFamily="2" charset="-78"/>
+              </a:rPr>
+              <a:t>Enumeration</a:t>
+            </a:r>
+            <a:endParaRPr lang="fa-IR" sz="1800" kern="1200" baseline="0" dirty="0">
+              <a:solidFill>
+                <a:srgbClr val="FFFFFF"/>
+              </a:solidFill>
+              <a:effectLst>
+                <a:outerShdw blurRad="177800" dist="38100" dir="2700000" algn="tl" rotWithShape="0">
+                  <a:srgbClr val="000000">
+                    <a:alpha val="24000"/>
+                  </a:srgbClr>
+                </a:outerShdw>
+              </a:effectLst>
+              <a:latin typeface="Tahoma" panose="020B0604030504040204" pitchFamily="34" charset="0"/>
+              <a:ea typeface="Tahoma" panose="020B0604030504040204" pitchFamily="34" charset="0"/>
+              <a:cs typeface="Tahoma" panose="020B0604030504040204" pitchFamily="34" charset="0"/>
+            </a:endParaRPr>
+          </a:p>
+          <a:p>
+            <a:pPr marL="285750" indent="-285750">
+              <a:buFont typeface="Arial" panose="020B0604020202020204" pitchFamily="34" charset="0"/>
+              <a:buChar char="•"/>
+            </a:pPr>
+            <a:r>
+              <a:rPr lang="en-US" sz="1800" kern="1200" baseline="0" dirty="0">
+                <a:solidFill>
+                  <a:srgbClr val="FFFFFF"/>
+                </a:solidFill>
+                <a:effectLst>
+                  <a:outerShdw blurRad="177800" dist="38100" dir="2700000" algn="tl" rotWithShape="0">
+                    <a:srgbClr val="000000">
+                      <a:alpha val="24000"/>
+                    </a:srgbClr>
+                  </a:outerShdw>
+                </a:effectLst>
+                <a:latin typeface="Tahoma" panose="020B0604030504040204" pitchFamily="34" charset="0"/>
+                <a:ea typeface="+mj-ea"/>
+                <a:cs typeface="B Lotus" panose="00000400000000000000" pitchFamily="2" charset="-78"/>
+              </a:rPr>
+              <a:t>Length and Rank</a:t>
+            </a:r>
+            <a:endParaRPr lang="fa-IR" sz="1800" dirty="0">
+              <a:solidFill>
+                <a:srgbClr val="FFFFFF"/>
+              </a:solidFill>
+              <a:effectLst>
+                <a:outerShdw blurRad="177800" dist="38100" dir="2700000" algn="tl" rotWithShape="0">
+                  <a:srgbClr val="000000">
+                    <a:alpha val="24000"/>
+                  </a:srgbClr>
+                </a:outerShdw>
+              </a:effectLst>
+              <a:latin typeface="Tahoma" panose="020B0604030504040204" pitchFamily="34" charset="0"/>
+              <a:ea typeface="Tahoma" panose="020B0604030504040204" pitchFamily="34" charset="0"/>
+              <a:cs typeface="Tahoma" panose="020B0604030504040204" pitchFamily="34" charset="0"/>
+            </a:endParaRPr>
+          </a:p>
+          <a:p>
+            <a:pPr marL="285750" indent="-285750">
+              <a:buFont typeface="Arial" panose="020B0604020202020204" pitchFamily="34" charset="0"/>
+              <a:buChar char="•"/>
+            </a:pPr>
+            <a:r>
+              <a:rPr lang="en-US" sz="1800" kern="1200" baseline="0" dirty="0">
+                <a:solidFill>
+                  <a:srgbClr val="FFFFFF"/>
+                </a:solidFill>
+                <a:effectLst>
+                  <a:outerShdw blurRad="177800" dist="38100" dir="2700000" algn="tl" rotWithShape="0">
+                    <a:srgbClr val="000000">
+                      <a:alpha val="24000"/>
+                    </a:srgbClr>
+                  </a:outerShdw>
+                </a:effectLst>
+                <a:latin typeface="Tahoma" panose="020B0604030504040204" pitchFamily="34" charset="0"/>
+                <a:ea typeface="+mj-ea"/>
+                <a:cs typeface="B Lotus" panose="00000400000000000000" pitchFamily="2" charset="-78"/>
+              </a:rPr>
+              <a:t>Searching</a:t>
+            </a:r>
+            <a:endParaRPr lang="fa-IR" sz="1800" kern="1200" baseline="0" dirty="0">
+              <a:solidFill>
+                <a:srgbClr val="FFFFFF"/>
+              </a:solidFill>
+              <a:effectLst>
+                <a:outerShdw blurRad="177800" dist="38100" dir="2700000" algn="tl" rotWithShape="0">
+                  <a:srgbClr val="000000">
+                    <a:alpha val="24000"/>
+                  </a:srgbClr>
+                </a:outerShdw>
+              </a:effectLst>
+              <a:latin typeface="Tahoma" panose="020B0604030504040204" pitchFamily="34" charset="0"/>
+              <a:ea typeface="Tahoma" panose="020B0604030504040204" pitchFamily="34" charset="0"/>
+              <a:cs typeface="Tahoma" panose="020B0604030504040204" pitchFamily="34" charset="0"/>
+            </a:endParaRPr>
+          </a:p>
+          <a:p>
+            <a:pPr marL="285750" indent="-285750">
+              <a:buFont typeface="Arial" panose="020B0604020202020204" pitchFamily="34" charset="0"/>
+              <a:buChar char="•"/>
+            </a:pPr>
+            <a:r>
+              <a:rPr lang="en-US" sz="1800" kern="1200" baseline="0" dirty="0">
+                <a:solidFill>
+                  <a:srgbClr val="FFFFFF"/>
+                </a:solidFill>
+                <a:effectLst>
+                  <a:outerShdw blurRad="177800" dist="38100" dir="2700000" algn="tl" rotWithShape="0">
+                    <a:srgbClr val="000000">
+                      <a:alpha val="24000"/>
+                    </a:srgbClr>
+                  </a:outerShdw>
+                </a:effectLst>
+                <a:latin typeface="Tahoma" panose="020B0604030504040204" pitchFamily="34" charset="0"/>
+                <a:ea typeface="+mj-ea"/>
+                <a:cs typeface="B Lotus" panose="00000400000000000000" pitchFamily="2" charset="-78"/>
+              </a:rPr>
+              <a:t>Sorting</a:t>
+            </a:r>
+            <a:endParaRPr lang="fa-IR" sz="1800" dirty="0">
+              <a:solidFill>
+                <a:srgbClr val="FFFFFF"/>
+              </a:solidFill>
+              <a:effectLst>
+                <a:outerShdw blurRad="177800" dist="38100" dir="2700000" algn="tl" rotWithShape="0">
+                  <a:srgbClr val="000000">
+                    <a:alpha val="24000"/>
+                  </a:srgbClr>
+                </a:outerShdw>
+              </a:effectLst>
+              <a:latin typeface="Tahoma" panose="020B0604030504040204" pitchFamily="34" charset="0"/>
+              <a:ea typeface="Tahoma" panose="020B0604030504040204" pitchFamily="34" charset="0"/>
+              <a:cs typeface="Tahoma" panose="020B0604030504040204" pitchFamily="34" charset="0"/>
+            </a:endParaRPr>
+          </a:p>
+          <a:p>
+            <a:pPr marL="285750" indent="-285750">
+              <a:buFont typeface="Arial" panose="020B0604020202020204" pitchFamily="34" charset="0"/>
+              <a:buChar char="•"/>
+            </a:pPr>
+            <a:r>
+              <a:rPr lang="en-US" sz="1800" kern="1200" baseline="0" dirty="0">
+                <a:solidFill>
+                  <a:srgbClr val="FFFFFF"/>
+                </a:solidFill>
+                <a:effectLst>
+                  <a:outerShdw blurRad="177800" dist="38100" dir="2700000" algn="tl" rotWithShape="0">
+                    <a:srgbClr val="000000">
+                      <a:alpha val="24000"/>
+                    </a:srgbClr>
+                  </a:outerShdw>
+                </a:effectLst>
+                <a:latin typeface="Tahoma" panose="020B0604030504040204" pitchFamily="34" charset="0"/>
+                <a:ea typeface="+mj-ea"/>
+                <a:cs typeface="B Lotus" panose="00000400000000000000" pitchFamily="2" charset="-78"/>
+              </a:rPr>
+              <a:t>Reversing Elements</a:t>
+            </a:r>
+            <a:endParaRPr lang="fa-IR" sz="1800" kern="1200" baseline="0" dirty="0">
+              <a:solidFill>
+                <a:srgbClr val="FFFFFF"/>
+              </a:solidFill>
+              <a:effectLst>
+                <a:outerShdw blurRad="177800" dist="38100" dir="2700000" algn="tl" rotWithShape="0">
+                  <a:srgbClr val="000000">
+                    <a:alpha val="24000"/>
+                  </a:srgbClr>
+                </a:outerShdw>
+              </a:effectLst>
+              <a:latin typeface="Tahoma" panose="020B0604030504040204" pitchFamily="34" charset="0"/>
+              <a:ea typeface="Tahoma" panose="020B0604030504040204" pitchFamily="34" charset="0"/>
+              <a:cs typeface="Tahoma" panose="020B0604030504040204" pitchFamily="34" charset="0"/>
+            </a:endParaRPr>
+          </a:p>
+          <a:p>
+            <a:pPr marL="285750" indent="-285750">
+              <a:buFont typeface="Arial" panose="020B0604020202020204" pitchFamily="34" charset="0"/>
+              <a:buChar char="•"/>
+            </a:pPr>
+            <a:r>
+              <a:rPr lang="en-US" sz="1800" kern="1200" baseline="0" dirty="0">
+                <a:solidFill>
+                  <a:srgbClr val="FFFFFF"/>
+                </a:solidFill>
+                <a:effectLst>
+                  <a:outerShdw blurRad="177800" dist="38100" dir="2700000" algn="tl" rotWithShape="0">
+                    <a:srgbClr val="000000">
+                      <a:alpha val="24000"/>
+                    </a:srgbClr>
+                  </a:outerShdw>
+                </a:effectLst>
+                <a:latin typeface="Tahoma" panose="020B0604030504040204" pitchFamily="34" charset="0"/>
+                <a:ea typeface="+mj-ea"/>
+                <a:cs typeface="B Lotus" panose="00000400000000000000" pitchFamily="2" charset="-78"/>
+              </a:rPr>
+              <a:t>Copying</a:t>
+            </a:r>
+            <a:endParaRPr lang="fa-IR" sz="1800" dirty="0">
+              <a:solidFill>
+                <a:srgbClr val="FFFFFF"/>
+              </a:solidFill>
+              <a:effectLst>
+                <a:outerShdw blurRad="177800" dist="38100" dir="2700000" algn="tl" rotWithShape="0">
+                  <a:srgbClr val="000000">
+                    <a:alpha val="24000"/>
+                  </a:srgbClr>
+                </a:outerShdw>
+              </a:effectLst>
+              <a:latin typeface="Tahoma" panose="020B0604030504040204" pitchFamily="34" charset="0"/>
+              <a:ea typeface="Tahoma" panose="020B0604030504040204" pitchFamily="34" charset="0"/>
+              <a:cs typeface="Tahoma" panose="020B0604030504040204" pitchFamily="34" charset="0"/>
+            </a:endParaRPr>
+          </a:p>
+          <a:p>
+            <a:pPr marL="285750" indent="-285750">
+              <a:buFont typeface="Arial" panose="020B0604020202020204" pitchFamily="34" charset="0"/>
+              <a:buChar char="•"/>
+            </a:pPr>
+            <a:r>
+              <a:rPr lang="en-US" sz="1800" kern="1200" baseline="0" dirty="0">
+                <a:solidFill>
+                  <a:srgbClr val="FFFFFF"/>
+                </a:solidFill>
+                <a:effectLst>
+                  <a:outerShdw blurRad="177800" dist="38100" dir="2700000" algn="tl" rotWithShape="0">
+                    <a:srgbClr val="000000">
+                      <a:alpha val="24000"/>
+                    </a:srgbClr>
+                  </a:outerShdw>
+                </a:effectLst>
+                <a:latin typeface="Tahoma" panose="020B0604030504040204" pitchFamily="34" charset="0"/>
+                <a:ea typeface="+mj-ea"/>
+                <a:cs typeface="B Lotus" panose="00000400000000000000" pitchFamily="2" charset="-78"/>
+              </a:rPr>
+              <a:t>Converting and Resizing</a:t>
+            </a:r>
+            <a:endParaRPr lang="fa-IR" sz="1800" kern="1200" baseline="0" dirty="0">
+              <a:solidFill>
+                <a:srgbClr val="FFFFFF"/>
+              </a:solidFill>
+              <a:effectLst>
+                <a:outerShdw blurRad="177800" dist="38100" dir="2700000" algn="tl" rotWithShape="0">
+                  <a:srgbClr val="000000">
+                    <a:alpha val="24000"/>
+                  </a:srgbClr>
+                </a:outerShdw>
+              </a:effectLst>
+              <a:latin typeface="Tahoma" panose="020B0604030504040204" pitchFamily="34" charset="0"/>
+              <a:ea typeface="Tahoma" panose="020B0604030504040204" pitchFamily="34" charset="0"/>
+              <a:cs typeface="Tahoma" panose="020B0604030504040204" pitchFamily="34" charset="0"/>
+            </a:endParaRPr>
+          </a:p>
+          <a:p>
+            <a:pPr marL="285750" indent="-285750">
+              <a:buFont typeface="Arial" panose="020B0604020202020204" pitchFamily="34" charset="0"/>
+              <a:buChar char="•"/>
+            </a:pPr>
             <a:endParaRPr lang="en-US" sz="1800" dirty="0">
               <a:latin typeface="Tahoma" panose="020B0604030504040204" pitchFamily="34" charset="0"/>
               <a:ea typeface="Tahoma" panose="020B0604030504040204" pitchFamily="34" charset="0"/>
@@ -12661,6 +12964,742 @@
     <p:extLst>
       <p:ext uri="{BB962C8B-B14F-4D97-AF65-F5344CB8AC3E}">
         <p14:creationId xmlns:p14="http://schemas.microsoft.com/office/powerpoint/2010/main" val="1388172335"/>
+      </p:ext>
+    </p:extLst>
+  </p:cSld>
+  <p:clrMapOvr>
+    <a:masterClrMapping/>
+  </p:clrMapOvr>
+</p:sld>
+</file>
+
+<file path=ppt/slides/slide10.xml><?xml version="1.0" encoding="utf-8"?>
+<p:sld xmlns:a="http://schemas.openxmlformats.org/drawingml/2006/main" xmlns:r="http://schemas.openxmlformats.org/officeDocument/2006/relationships" xmlns:p="http://schemas.openxmlformats.org/presentationml/2006/main">
+  <p:cSld>
+    <p:spTree>
+      <p:nvGrpSpPr>
+        <p:cNvPr id="1" name=""/>
+        <p:cNvGrpSpPr/>
+        <p:nvPr/>
+      </p:nvGrpSpPr>
+      <p:grpSpPr>
+        <a:xfrm>
+          <a:off x="0" y="0"/>
+          <a:ext cx="0" cy="0"/>
+          <a:chOff x="0" y="0"/>
+          <a:chExt cx="0" cy="0"/>
+        </a:xfrm>
+      </p:grpSpPr>
+      <p:sp>
+        <p:nvSpPr>
+          <p:cNvPr id="2" name="Title 1">
+            <a:extLst>
+              <a:ext uri="{FF2B5EF4-FFF2-40B4-BE49-F238E27FC236}">
+                <a16:creationId xmlns:a16="http://schemas.microsoft.com/office/drawing/2014/main" id="{4EF72416-B3DD-920F-1E2D-AC63810A536E}"/>
+              </a:ext>
+            </a:extLst>
+          </p:cNvPr>
+          <p:cNvSpPr>
+            <a:spLocks noGrp="1"/>
+          </p:cNvSpPr>
+          <p:nvPr>
+            <p:ph type="title"/>
+          </p:nvPr>
+        </p:nvSpPr>
+        <p:spPr/>
+        <p:txBody>
+          <a:bodyPr/>
+          <a:lstStyle/>
+          <a:p>
+            <a:pPr algn="ctr"/>
+            <a:r>
+              <a:rPr lang="en-US" cap="none" dirty="0">
+                <a:latin typeface="Tahoma" panose="020B0604030504040204" pitchFamily="34" charset="0"/>
+                <a:cs typeface="B Lotus" panose="00000400000000000000" pitchFamily="2" charset="-78"/>
+              </a:rPr>
+              <a:t>Sorting</a:t>
+            </a:r>
+          </a:p>
+        </p:txBody>
+      </p:sp>
+      <p:sp>
+        <p:nvSpPr>
+          <p:cNvPr id="3" name="Content Placeholder 2">
+            <a:extLst>
+              <a:ext uri="{FF2B5EF4-FFF2-40B4-BE49-F238E27FC236}">
+                <a16:creationId xmlns:a16="http://schemas.microsoft.com/office/drawing/2014/main" id="{E22DB625-3035-E58A-78AF-734BBE972FEE}"/>
+              </a:ext>
+            </a:extLst>
+          </p:cNvPr>
+          <p:cNvSpPr>
+            <a:spLocks noGrp="1"/>
+          </p:cNvSpPr>
+          <p:nvPr>
+            <p:ph idx="1"/>
+          </p:nvPr>
+        </p:nvSpPr>
+        <p:spPr/>
+        <p:txBody>
+          <a:bodyPr>
+            <a:normAutofit/>
+          </a:bodyPr>
+          <a:lstStyle/>
+          <a:p>
+            <a:pPr marL="0" indent="0" algn="r" rtl="1">
+              <a:buNone/>
+            </a:pPr>
+            <a:r>
+              <a:rPr lang="fa-IR" dirty="0">
+                <a:latin typeface="Tahoma" panose="020B0604030504040204" pitchFamily="34" charset="0"/>
+                <a:cs typeface="B Lotus" panose="00000400000000000000" pitchFamily="2" charset="-78"/>
+              </a:rPr>
+              <a:t>کلاس </a:t>
+            </a:r>
+            <a:r>
+              <a:rPr lang="en-US" dirty="0">
+                <a:latin typeface="Tahoma" panose="020B0604030504040204" pitchFamily="34" charset="0"/>
+                <a:cs typeface="B Lotus" panose="00000400000000000000" pitchFamily="2" charset="-78"/>
+              </a:rPr>
+              <a:t>Array</a:t>
+            </a:r>
+            <a:r>
+              <a:rPr lang="fa-IR" dirty="0">
+                <a:latin typeface="Tahoma" panose="020B0604030504040204" pitchFamily="34" charset="0"/>
+                <a:cs typeface="B Lotus" panose="00000400000000000000" pitchFamily="2" charset="-78"/>
+              </a:rPr>
+              <a:t> یک متد </a:t>
+            </a:r>
+            <a:r>
+              <a:rPr lang="en-US" dirty="0">
+                <a:latin typeface="Tahoma" panose="020B0604030504040204" pitchFamily="34" charset="0"/>
+                <a:cs typeface="B Lotus" panose="00000400000000000000" pitchFamily="2" charset="-78"/>
+              </a:rPr>
+              <a:t>built-in</a:t>
+            </a:r>
+            <a:r>
+              <a:rPr lang="fa-IR" dirty="0">
+                <a:latin typeface="Tahoma" panose="020B0604030504040204" pitchFamily="34" charset="0"/>
+                <a:cs typeface="B Lotus" panose="00000400000000000000" pitchFamily="2" charset="-78"/>
+              </a:rPr>
+              <a:t> داره برای مرتب کردن عناصر خودش.</a:t>
+            </a:r>
+          </a:p>
+          <a:p>
+            <a:pPr marL="0" indent="0" algn="r" rtl="1">
+              <a:buNone/>
+            </a:pPr>
+            <a:r>
+              <a:rPr lang="fa-IR" dirty="0">
+                <a:latin typeface="Tahoma" panose="020B0604030504040204" pitchFamily="34" charset="0"/>
+                <a:cs typeface="B Lotus" panose="00000400000000000000" pitchFamily="2" charset="-78"/>
+              </a:rPr>
+              <a:t>این متد فقط برای یک بعد آرایه کاربرد داره و هرنوعی که </a:t>
+            </a:r>
+            <a:r>
+              <a:rPr lang="en-US" dirty="0" err="1">
+                <a:latin typeface="Tahoma" panose="020B0604030504040204" pitchFamily="34" charset="0"/>
+                <a:cs typeface="B Lotus" panose="00000400000000000000" pitchFamily="2" charset="-78"/>
+              </a:rPr>
+              <a:t>IComparable</a:t>
+            </a:r>
+            <a:r>
+              <a:rPr lang="fa-IR" dirty="0">
+                <a:latin typeface="Tahoma" panose="020B0604030504040204" pitchFamily="34" charset="0"/>
+                <a:cs typeface="B Lotus" panose="00000400000000000000" pitchFamily="2" charset="-78"/>
+              </a:rPr>
+              <a:t> رو پیاده سازی کرده باشه میتونه سورت کنه. </a:t>
+            </a:r>
+          </a:p>
+        </p:txBody>
+      </p:sp>
+      <p:pic>
+        <p:nvPicPr>
+          <p:cNvPr id="5" name="Picture 4">
+            <a:extLst>
+              <a:ext uri="{FF2B5EF4-FFF2-40B4-BE49-F238E27FC236}">
+                <a16:creationId xmlns:a16="http://schemas.microsoft.com/office/drawing/2014/main" id="{326A0AF0-B30B-1ED4-6D06-80508F52294F}"/>
+              </a:ext>
+            </a:extLst>
+          </p:cNvPr>
+          <p:cNvPicPr>
+            <a:picLocks noChangeAspect="1"/>
+          </p:cNvPicPr>
+          <p:nvPr/>
+        </p:nvPicPr>
+        <p:blipFill>
+          <a:blip r:embed="rId2"/>
+          <a:stretch>
+            <a:fillRect/>
+          </a:stretch>
+        </p:blipFill>
+        <p:spPr>
+          <a:xfrm>
+            <a:off x="1605760" y="3600373"/>
+            <a:ext cx="4623589" cy="2306834"/>
+          </a:xfrm>
+          <a:prstGeom prst="rect">
+            <a:avLst/>
+          </a:prstGeom>
+        </p:spPr>
+      </p:pic>
+    </p:spTree>
+    <p:extLst>
+      <p:ext uri="{BB962C8B-B14F-4D97-AF65-F5344CB8AC3E}">
+        <p14:creationId xmlns:p14="http://schemas.microsoft.com/office/powerpoint/2010/main" val="2997427291"/>
+      </p:ext>
+    </p:extLst>
+  </p:cSld>
+  <p:clrMapOvr>
+    <a:masterClrMapping/>
+  </p:clrMapOvr>
+</p:sld>
+</file>
+
+<file path=ppt/slides/slide11.xml><?xml version="1.0" encoding="utf-8"?>
+<p:sld xmlns:a="http://schemas.openxmlformats.org/drawingml/2006/main" xmlns:r="http://schemas.openxmlformats.org/officeDocument/2006/relationships" xmlns:p="http://schemas.openxmlformats.org/presentationml/2006/main">
+  <p:cSld>
+    <p:spTree>
+      <p:nvGrpSpPr>
+        <p:cNvPr id="1" name=""/>
+        <p:cNvGrpSpPr/>
+        <p:nvPr/>
+      </p:nvGrpSpPr>
+      <p:grpSpPr>
+        <a:xfrm>
+          <a:off x="0" y="0"/>
+          <a:ext cx="0" cy="0"/>
+          <a:chOff x="0" y="0"/>
+          <a:chExt cx="0" cy="0"/>
+        </a:xfrm>
+      </p:grpSpPr>
+      <p:sp>
+        <p:nvSpPr>
+          <p:cNvPr id="2" name="Title 1">
+            <a:extLst>
+              <a:ext uri="{FF2B5EF4-FFF2-40B4-BE49-F238E27FC236}">
+                <a16:creationId xmlns:a16="http://schemas.microsoft.com/office/drawing/2014/main" id="{4EF72416-B3DD-920F-1E2D-AC63810A536E}"/>
+              </a:ext>
+            </a:extLst>
+          </p:cNvPr>
+          <p:cNvSpPr>
+            <a:spLocks noGrp="1"/>
+          </p:cNvSpPr>
+          <p:nvPr>
+            <p:ph type="title"/>
+          </p:nvPr>
+        </p:nvSpPr>
+        <p:spPr/>
+        <p:txBody>
+          <a:bodyPr/>
+          <a:lstStyle/>
+          <a:p>
+            <a:pPr algn="ctr"/>
+            <a:r>
+              <a:rPr lang="en-US" cap="none" dirty="0">
+                <a:latin typeface="Tahoma" panose="020B0604030504040204" pitchFamily="34" charset="0"/>
+                <a:cs typeface="B Lotus" panose="00000400000000000000" pitchFamily="2" charset="-78"/>
+              </a:rPr>
+              <a:t>Reversing Elements</a:t>
+            </a:r>
+          </a:p>
+        </p:txBody>
+      </p:sp>
+      <p:sp>
+        <p:nvSpPr>
+          <p:cNvPr id="3" name="Content Placeholder 2">
+            <a:extLst>
+              <a:ext uri="{FF2B5EF4-FFF2-40B4-BE49-F238E27FC236}">
+                <a16:creationId xmlns:a16="http://schemas.microsoft.com/office/drawing/2014/main" id="{E22DB625-3035-E58A-78AF-734BBE972FEE}"/>
+              </a:ext>
+            </a:extLst>
+          </p:cNvPr>
+          <p:cNvSpPr>
+            <a:spLocks noGrp="1"/>
+          </p:cNvSpPr>
+          <p:nvPr>
+            <p:ph idx="1"/>
+          </p:nvPr>
+        </p:nvSpPr>
+        <p:spPr/>
+        <p:txBody>
+          <a:bodyPr>
+            <a:normAutofit/>
+          </a:bodyPr>
+          <a:lstStyle/>
+          <a:p>
+            <a:pPr marL="0" indent="0" algn="r" rtl="1">
+              <a:buNone/>
+            </a:pPr>
+            <a:r>
+              <a:rPr lang="fa-IR" dirty="0">
+                <a:latin typeface="Tahoma" panose="020B0604030504040204" pitchFamily="34" charset="0"/>
+                <a:cs typeface="B Lotus" panose="00000400000000000000" pitchFamily="2" charset="-78"/>
+              </a:rPr>
+              <a:t>با استفاده از متد </a:t>
+            </a:r>
+            <a:r>
+              <a:rPr lang="en-US" dirty="0">
+                <a:latin typeface="Tahoma" panose="020B0604030504040204" pitchFamily="34" charset="0"/>
+                <a:cs typeface="B Lotus" panose="00000400000000000000" pitchFamily="2" charset="-78"/>
+              </a:rPr>
+              <a:t>reverse</a:t>
+            </a:r>
+            <a:r>
+              <a:rPr lang="fa-IR" dirty="0">
+                <a:latin typeface="Tahoma" panose="020B0604030504040204" pitchFamily="34" charset="0"/>
+                <a:cs typeface="B Lotus" panose="00000400000000000000" pitchFamily="2" charset="-78"/>
+              </a:rPr>
+              <a:t> میتونیم عناصر یک آرایه رو برعکس کنیم:</a:t>
+            </a:r>
+          </a:p>
+        </p:txBody>
+      </p:sp>
+      <p:pic>
+        <p:nvPicPr>
+          <p:cNvPr id="6" name="Picture 5">
+            <a:extLst>
+              <a:ext uri="{FF2B5EF4-FFF2-40B4-BE49-F238E27FC236}">
+                <a16:creationId xmlns:a16="http://schemas.microsoft.com/office/drawing/2014/main" id="{647BF9DC-42B8-B943-F6E8-1073CB5A2271}"/>
+              </a:ext>
+            </a:extLst>
+          </p:cNvPr>
+          <p:cNvPicPr>
+            <a:picLocks noChangeAspect="1"/>
+          </p:cNvPicPr>
+          <p:nvPr/>
+        </p:nvPicPr>
+        <p:blipFill>
+          <a:blip r:embed="rId2"/>
+          <a:stretch>
+            <a:fillRect/>
+          </a:stretch>
+        </p:blipFill>
+        <p:spPr>
+          <a:xfrm>
+            <a:off x="1866745" y="3314682"/>
+            <a:ext cx="4979355" cy="585806"/>
+          </a:xfrm>
+          <a:prstGeom prst="rect">
+            <a:avLst/>
+          </a:prstGeom>
+        </p:spPr>
+      </p:pic>
+    </p:spTree>
+    <p:extLst>
+      <p:ext uri="{BB962C8B-B14F-4D97-AF65-F5344CB8AC3E}">
+        <p14:creationId xmlns:p14="http://schemas.microsoft.com/office/powerpoint/2010/main" val="3518340179"/>
+      </p:ext>
+    </p:extLst>
+  </p:cSld>
+  <p:clrMapOvr>
+    <a:masterClrMapping/>
+  </p:clrMapOvr>
+</p:sld>
+</file>
+
+<file path=ppt/slides/slide12.xml><?xml version="1.0" encoding="utf-8"?>
+<p:sld xmlns:a="http://schemas.openxmlformats.org/drawingml/2006/main" xmlns:r="http://schemas.openxmlformats.org/officeDocument/2006/relationships" xmlns:p="http://schemas.openxmlformats.org/presentationml/2006/main">
+  <p:cSld>
+    <p:spTree>
+      <p:nvGrpSpPr>
+        <p:cNvPr id="1" name=""/>
+        <p:cNvGrpSpPr/>
+        <p:nvPr/>
+      </p:nvGrpSpPr>
+      <p:grpSpPr>
+        <a:xfrm>
+          <a:off x="0" y="0"/>
+          <a:ext cx="0" cy="0"/>
+          <a:chOff x="0" y="0"/>
+          <a:chExt cx="0" cy="0"/>
+        </a:xfrm>
+      </p:grpSpPr>
+      <p:sp>
+        <p:nvSpPr>
+          <p:cNvPr id="2" name="Title 1">
+            <a:extLst>
+              <a:ext uri="{FF2B5EF4-FFF2-40B4-BE49-F238E27FC236}">
+                <a16:creationId xmlns:a16="http://schemas.microsoft.com/office/drawing/2014/main" id="{4EF72416-B3DD-920F-1E2D-AC63810A536E}"/>
+              </a:ext>
+            </a:extLst>
+          </p:cNvPr>
+          <p:cNvSpPr>
+            <a:spLocks noGrp="1"/>
+          </p:cNvSpPr>
+          <p:nvPr>
+            <p:ph type="title"/>
+          </p:nvPr>
+        </p:nvSpPr>
+        <p:spPr>
+          <a:xfrm>
+            <a:off x="1131887" y="618518"/>
+            <a:ext cx="9905998" cy="1478570"/>
+          </a:xfrm>
+        </p:spPr>
+        <p:txBody>
+          <a:bodyPr/>
+          <a:lstStyle/>
+          <a:p>
+            <a:pPr algn="ctr"/>
+            <a:r>
+              <a:rPr lang="en-US" cap="none" dirty="0">
+                <a:latin typeface="Tahoma" panose="020B0604030504040204" pitchFamily="34" charset="0"/>
+                <a:cs typeface="B Lotus" panose="00000400000000000000" pitchFamily="2" charset="-78"/>
+              </a:rPr>
+              <a:t>Copying</a:t>
+            </a:r>
+          </a:p>
+        </p:txBody>
+      </p:sp>
+      <p:sp>
+        <p:nvSpPr>
+          <p:cNvPr id="3" name="Content Placeholder 2">
+            <a:extLst>
+              <a:ext uri="{FF2B5EF4-FFF2-40B4-BE49-F238E27FC236}">
+                <a16:creationId xmlns:a16="http://schemas.microsoft.com/office/drawing/2014/main" id="{E22DB625-3035-E58A-78AF-734BBE972FEE}"/>
+              </a:ext>
+            </a:extLst>
+          </p:cNvPr>
+          <p:cNvSpPr>
+            <a:spLocks noGrp="1"/>
+          </p:cNvSpPr>
+          <p:nvPr>
+            <p:ph idx="1"/>
+          </p:nvPr>
+        </p:nvSpPr>
+        <p:spPr/>
+        <p:txBody>
+          <a:bodyPr>
+            <a:normAutofit/>
+          </a:bodyPr>
+          <a:lstStyle/>
+          <a:p>
+            <a:pPr marL="0" indent="0" algn="r" rtl="1">
+              <a:buNone/>
+            </a:pPr>
+            <a:r>
+              <a:rPr lang="fa-IR" dirty="0">
+                <a:latin typeface="Tahoma" panose="020B0604030504040204" pitchFamily="34" charset="0"/>
+                <a:cs typeface="B Lotus" panose="00000400000000000000" pitchFamily="2" charset="-78"/>
+              </a:rPr>
+              <a:t>برای کپی کردن یک آرایه چهار متد زیر وجود دارد:</a:t>
+            </a:r>
+          </a:p>
+          <a:p>
+            <a:pPr marL="0" indent="0" algn="l">
+              <a:buNone/>
+            </a:pPr>
+            <a:r>
+              <a:rPr lang="en-US" dirty="0">
+                <a:latin typeface="Tahoma" panose="020B0604030504040204" pitchFamily="34" charset="0"/>
+                <a:cs typeface="B Lotus" panose="00000400000000000000" pitchFamily="2" charset="-78"/>
+              </a:rPr>
+              <a:t>Clone, Copy, </a:t>
+            </a:r>
+            <a:r>
+              <a:rPr lang="en-US" dirty="0" err="1">
+                <a:latin typeface="Tahoma" panose="020B0604030504040204" pitchFamily="34" charset="0"/>
+                <a:cs typeface="B Lotus" panose="00000400000000000000" pitchFamily="2" charset="-78"/>
+              </a:rPr>
+              <a:t>CopyTo</a:t>
+            </a:r>
+            <a:r>
+              <a:rPr lang="en-US" dirty="0">
+                <a:latin typeface="Tahoma" panose="020B0604030504040204" pitchFamily="34" charset="0"/>
+                <a:cs typeface="B Lotus" panose="00000400000000000000" pitchFamily="2" charset="-78"/>
+              </a:rPr>
+              <a:t>, </a:t>
+            </a:r>
+            <a:r>
+              <a:rPr lang="en-US" dirty="0" err="1">
+                <a:latin typeface="Tahoma" panose="020B0604030504040204" pitchFamily="34" charset="0"/>
+                <a:cs typeface="B Lotus" panose="00000400000000000000" pitchFamily="2" charset="-78"/>
+              </a:rPr>
+              <a:t>ConstrainedCopy</a:t>
+            </a:r>
+            <a:endParaRPr lang="en-US" dirty="0">
+              <a:latin typeface="Tahoma" panose="020B0604030504040204" pitchFamily="34" charset="0"/>
+              <a:cs typeface="B Lotus" panose="00000400000000000000" pitchFamily="2" charset="-78"/>
+            </a:endParaRPr>
+          </a:p>
+          <a:p>
+            <a:pPr algn="r" rtl="1"/>
+            <a:r>
+              <a:rPr lang="fa-IR" dirty="0">
+                <a:latin typeface="Tahoma" panose="020B0604030504040204" pitchFamily="34" charset="0"/>
+                <a:cs typeface="B Lotus" panose="00000400000000000000" pitchFamily="2" charset="-78"/>
+              </a:rPr>
+              <a:t>هر چهار متد </a:t>
+            </a:r>
+            <a:r>
+              <a:rPr lang="en-US" dirty="0">
+                <a:latin typeface="Tahoma" panose="020B0604030504040204" pitchFamily="34" charset="0"/>
+                <a:cs typeface="B Lotus" panose="00000400000000000000" pitchFamily="2" charset="-78"/>
+              </a:rPr>
+              <a:t>shallow-copy</a:t>
+            </a:r>
+            <a:r>
+              <a:rPr lang="fa-IR" dirty="0">
+                <a:latin typeface="Tahoma" panose="020B0604030504040204" pitchFamily="34" charset="0"/>
+                <a:cs typeface="B Lotus" panose="00000400000000000000" pitchFamily="2" charset="-78"/>
+              </a:rPr>
+              <a:t> انجام میدهند.</a:t>
+            </a:r>
+          </a:p>
+          <a:p>
+            <a:pPr marL="0" indent="0" algn="r" rtl="1">
+              <a:buNone/>
+            </a:pPr>
+            <a:endParaRPr lang="fa-IR" dirty="0">
+              <a:latin typeface="Tahoma" panose="020B0604030504040204" pitchFamily="34" charset="0"/>
+              <a:cs typeface="B Lotus" panose="00000400000000000000" pitchFamily="2" charset="-78"/>
+            </a:endParaRPr>
+          </a:p>
+        </p:txBody>
+      </p:sp>
+      <p:pic>
+        <p:nvPicPr>
+          <p:cNvPr id="5" name="Picture 4">
+            <a:extLst>
+              <a:ext uri="{FF2B5EF4-FFF2-40B4-BE49-F238E27FC236}">
+                <a16:creationId xmlns:a16="http://schemas.microsoft.com/office/drawing/2014/main" id="{4F48F69F-F014-3920-B266-6D2D15B22874}"/>
+              </a:ext>
+            </a:extLst>
+          </p:cNvPr>
+          <p:cNvPicPr>
+            <a:picLocks noChangeAspect="1"/>
+          </p:cNvPicPr>
+          <p:nvPr/>
+        </p:nvPicPr>
+        <p:blipFill>
+          <a:blip r:embed="rId2"/>
+          <a:stretch>
+            <a:fillRect/>
+          </a:stretch>
+        </p:blipFill>
+        <p:spPr>
+          <a:xfrm>
+            <a:off x="1205694" y="3395662"/>
+            <a:ext cx="5153438" cy="2286000"/>
+          </a:xfrm>
+          <a:prstGeom prst="rect">
+            <a:avLst/>
+          </a:prstGeom>
+        </p:spPr>
+      </p:pic>
+    </p:spTree>
+    <p:extLst>
+      <p:ext uri="{BB962C8B-B14F-4D97-AF65-F5344CB8AC3E}">
+        <p14:creationId xmlns:p14="http://schemas.microsoft.com/office/powerpoint/2010/main" val="3763403360"/>
+      </p:ext>
+    </p:extLst>
+  </p:cSld>
+  <p:clrMapOvr>
+    <a:masterClrMapping/>
+  </p:clrMapOvr>
+</p:sld>
+</file>
+
+<file path=ppt/slides/slide13.xml><?xml version="1.0" encoding="utf-8"?>
+<p:sld xmlns:a="http://schemas.openxmlformats.org/drawingml/2006/main" xmlns:r="http://schemas.openxmlformats.org/officeDocument/2006/relationships" xmlns:p="http://schemas.openxmlformats.org/presentationml/2006/main">
+  <p:cSld>
+    <p:spTree>
+      <p:nvGrpSpPr>
+        <p:cNvPr id="1" name=""/>
+        <p:cNvGrpSpPr/>
+        <p:nvPr/>
+      </p:nvGrpSpPr>
+      <p:grpSpPr>
+        <a:xfrm>
+          <a:off x="0" y="0"/>
+          <a:ext cx="0" cy="0"/>
+          <a:chOff x="0" y="0"/>
+          <a:chExt cx="0" cy="0"/>
+        </a:xfrm>
+      </p:grpSpPr>
+      <p:sp>
+        <p:nvSpPr>
+          <p:cNvPr id="2" name="Title 1">
+            <a:extLst>
+              <a:ext uri="{FF2B5EF4-FFF2-40B4-BE49-F238E27FC236}">
+                <a16:creationId xmlns:a16="http://schemas.microsoft.com/office/drawing/2014/main" id="{4EF72416-B3DD-920F-1E2D-AC63810A536E}"/>
+              </a:ext>
+            </a:extLst>
+          </p:cNvPr>
+          <p:cNvSpPr>
+            <a:spLocks noGrp="1"/>
+          </p:cNvSpPr>
+          <p:nvPr>
+            <p:ph type="title"/>
+          </p:nvPr>
+        </p:nvSpPr>
+        <p:spPr/>
+        <p:txBody>
+          <a:bodyPr/>
+          <a:lstStyle/>
+          <a:p>
+            <a:pPr algn="ctr"/>
+            <a:r>
+              <a:rPr lang="en-US" cap="none" dirty="0">
+                <a:latin typeface="Tahoma" panose="020B0604030504040204" pitchFamily="34" charset="0"/>
+                <a:cs typeface="B Lotus" panose="00000400000000000000" pitchFamily="2" charset="-78"/>
+              </a:rPr>
+              <a:t>Converting and Resizing</a:t>
+            </a:r>
+          </a:p>
+        </p:txBody>
+      </p:sp>
+      <p:sp>
+        <p:nvSpPr>
+          <p:cNvPr id="3" name="Content Placeholder 2">
+            <a:extLst>
+              <a:ext uri="{FF2B5EF4-FFF2-40B4-BE49-F238E27FC236}">
+                <a16:creationId xmlns:a16="http://schemas.microsoft.com/office/drawing/2014/main" id="{E22DB625-3035-E58A-78AF-734BBE972FEE}"/>
+              </a:ext>
+            </a:extLst>
+          </p:cNvPr>
+          <p:cNvSpPr>
+            <a:spLocks noGrp="1"/>
+          </p:cNvSpPr>
+          <p:nvPr>
+            <p:ph idx="1"/>
+          </p:nvPr>
+        </p:nvSpPr>
+        <p:spPr/>
+        <p:txBody>
+          <a:bodyPr>
+            <a:normAutofit/>
+          </a:bodyPr>
+          <a:lstStyle/>
+          <a:p>
+            <a:pPr marL="0" indent="0" algn="r" rtl="1">
+              <a:buNone/>
+            </a:pPr>
+            <a:r>
+              <a:rPr lang="fa-IR" dirty="0">
+                <a:latin typeface="Tahoma" panose="020B0604030504040204" pitchFamily="34" charset="0"/>
+                <a:cs typeface="B Lotus" panose="00000400000000000000" pitchFamily="2" charset="-78"/>
+              </a:rPr>
+              <a:t>متد </a:t>
+            </a:r>
+            <a:r>
+              <a:rPr lang="en-US" dirty="0" err="1">
+                <a:latin typeface="Tahoma" panose="020B0604030504040204" pitchFamily="34" charset="0"/>
+                <a:cs typeface="B Lotus" panose="00000400000000000000" pitchFamily="2" charset="-78"/>
+              </a:rPr>
+              <a:t>ConvertAll</a:t>
+            </a:r>
+            <a:r>
+              <a:rPr lang="fa-IR" dirty="0">
+                <a:latin typeface="Tahoma" panose="020B0604030504040204" pitchFamily="34" charset="0"/>
+                <a:cs typeface="B Lotus" panose="00000400000000000000" pitchFamily="2" charset="-78"/>
+              </a:rPr>
+              <a:t> میتونه همه آیتمهای یک آرایه رو به</a:t>
+            </a:r>
+            <a:r>
+              <a:rPr lang="en-US" dirty="0">
+                <a:latin typeface="Tahoma" panose="020B0604030504040204" pitchFamily="34" charset="0"/>
+                <a:cs typeface="B Lotus" panose="00000400000000000000" pitchFamily="2" charset="-78"/>
+              </a:rPr>
+              <a:t> </a:t>
+            </a:r>
+            <a:r>
+              <a:rPr lang="fa-IR" dirty="0">
+                <a:latin typeface="Tahoma" panose="020B0604030504040204" pitchFamily="34" charset="0"/>
+                <a:cs typeface="B Lotus" panose="00000400000000000000" pitchFamily="2" charset="-78"/>
+              </a:rPr>
+              <a:t>یک نوع دیگر تبدیل کند.</a:t>
+            </a:r>
+          </a:p>
+          <a:p>
+            <a:pPr marL="0" indent="0" algn="r" rtl="1">
+              <a:buNone/>
+            </a:pPr>
+            <a:endParaRPr lang="fa-IR" dirty="0">
+              <a:latin typeface="Tahoma" panose="020B0604030504040204" pitchFamily="34" charset="0"/>
+              <a:cs typeface="B Lotus" panose="00000400000000000000" pitchFamily="2" charset="-78"/>
+            </a:endParaRPr>
+          </a:p>
+          <a:p>
+            <a:pPr marL="0" indent="0" algn="r" rtl="1">
+              <a:buNone/>
+            </a:pPr>
+            <a:endParaRPr lang="fa-IR" dirty="0">
+              <a:latin typeface="Tahoma" panose="020B0604030504040204" pitchFamily="34" charset="0"/>
+              <a:cs typeface="B Lotus" panose="00000400000000000000" pitchFamily="2" charset="-78"/>
+            </a:endParaRPr>
+          </a:p>
+          <a:p>
+            <a:pPr marL="0" indent="0" algn="r" rtl="1">
+              <a:buNone/>
+            </a:pPr>
+            <a:endParaRPr lang="fa-IR" dirty="0">
+              <a:latin typeface="Tahoma" panose="020B0604030504040204" pitchFamily="34" charset="0"/>
+              <a:cs typeface="B Lotus" panose="00000400000000000000" pitchFamily="2" charset="-78"/>
+            </a:endParaRPr>
+          </a:p>
+          <a:p>
+            <a:pPr marL="0" indent="0" algn="r" rtl="1">
+              <a:buNone/>
+            </a:pPr>
+            <a:r>
+              <a:rPr lang="fa-IR" dirty="0">
+                <a:latin typeface="Tahoma" panose="020B0604030504040204" pitchFamily="34" charset="0"/>
+                <a:cs typeface="B Lotus" panose="00000400000000000000" pitchFamily="2" charset="-78"/>
+              </a:rPr>
+              <a:t>همینطور با استفاده از متد </a:t>
+            </a:r>
+            <a:r>
+              <a:rPr lang="en-US" dirty="0">
+                <a:latin typeface="Tahoma" panose="020B0604030504040204" pitchFamily="34" charset="0"/>
+                <a:cs typeface="B Lotus" panose="00000400000000000000" pitchFamily="2" charset="-78"/>
+              </a:rPr>
+              <a:t>resize</a:t>
+            </a:r>
+            <a:r>
+              <a:rPr lang="fa-IR" dirty="0">
+                <a:latin typeface="Tahoma" panose="020B0604030504040204" pitchFamily="34" charset="0"/>
+                <a:cs typeface="B Lotus" panose="00000400000000000000" pitchFamily="2" charset="-78"/>
+              </a:rPr>
+              <a:t> میتونیم اندازه یک آرایه رو تغییر بدیم. </a:t>
+            </a:r>
+          </a:p>
+        </p:txBody>
+      </p:sp>
+      <p:pic>
+        <p:nvPicPr>
+          <p:cNvPr id="6" name="Picture 5">
+            <a:extLst>
+              <a:ext uri="{FF2B5EF4-FFF2-40B4-BE49-F238E27FC236}">
+                <a16:creationId xmlns:a16="http://schemas.microsoft.com/office/drawing/2014/main" id="{FFCDB600-9FE0-0000-952B-AD0402937184}"/>
+              </a:ext>
+            </a:extLst>
+          </p:cNvPr>
+          <p:cNvPicPr>
+            <a:picLocks noChangeAspect="1"/>
+          </p:cNvPicPr>
+          <p:nvPr/>
+        </p:nvPicPr>
+        <p:blipFill>
+          <a:blip r:embed="rId2"/>
+          <a:stretch>
+            <a:fillRect/>
+          </a:stretch>
+        </p:blipFill>
+        <p:spPr>
+          <a:xfrm>
+            <a:off x="1376170" y="2853638"/>
+            <a:ext cx="6086670" cy="1623112"/>
+          </a:xfrm>
+          <a:prstGeom prst="rect">
+            <a:avLst/>
+          </a:prstGeom>
+        </p:spPr>
+      </p:pic>
+    </p:spTree>
+    <p:extLst>
+      <p:ext uri="{BB962C8B-B14F-4D97-AF65-F5344CB8AC3E}">
+        <p14:creationId xmlns:p14="http://schemas.microsoft.com/office/powerpoint/2010/main" val="815460150"/>
       </p:ext>
     </p:extLst>
   </p:cSld>
@@ -12745,17 +13784,1674 @@
             <a:pPr marL="0" indent="0" algn="r" rtl="1">
               <a:buNone/>
             </a:pPr>
+            <a:r>
+              <a:rPr lang="fa-IR" dirty="0">
+                <a:latin typeface="Tahoma" panose="020B0604030504040204" pitchFamily="34" charset="0"/>
+                <a:cs typeface="B Lotus" panose="00000400000000000000" pitchFamily="2" charset="-78"/>
+              </a:rPr>
+              <a:t>راحت‌ترین راه برای تعریف آرایه استفاده از ساختارهای زبان </a:t>
+            </a:r>
+            <a:r>
+              <a:rPr lang="en-US" dirty="0">
+                <a:latin typeface="Tahoma" panose="020B0604030504040204" pitchFamily="34" charset="0"/>
+                <a:cs typeface="B Lotus" panose="00000400000000000000" pitchFamily="2" charset="-78"/>
+              </a:rPr>
+              <a:t>C#</a:t>
+            </a:r>
+            <a:r>
+              <a:rPr lang="fa-IR" dirty="0">
+                <a:latin typeface="Tahoma" panose="020B0604030504040204" pitchFamily="34" charset="0"/>
+                <a:cs typeface="B Lotus" panose="00000400000000000000" pitchFamily="2" charset="-78"/>
+              </a:rPr>
+              <a:t> هست:</a:t>
+            </a:r>
+          </a:p>
+          <a:p>
+            <a:pPr marL="0" indent="0" algn="r" rtl="1">
+              <a:buNone/>
+            </a:pPr>
             <a:endParaRPr lang="fa-IR" dirty="0">
               <a:latin typeface="Tahoma" panose="020B0604030504040204" pitchFamily="34" charset="0"/>
               <a:cs typeface="B Lotus" panose="00000400000000000000" pitchFamily="2" charset="-78"/>
             </a:endParaRPr>
+          </a:p>
+          <a:p>
+            <a:pPr marL="0" indent="0" algn="r" rtl="1">
+              <a:buNone/>
+            </a:pPr>
+            <a:endParaRPr lang="fa-IR" dirty="0">
+              <a:latin typeface="Tahoma" panose="020B0604030504040204" pitchFamily="34" charset="0"/>
+              <a:cs typeface="B Lotus" panose="00000400000000000000" pitchFamily="2" charset="-78"/>
+            </a:endParaRPr>
+          </a:p>
+          <a:p>
+            <a:pPr marL="0" indent="0" algn="r" rtl="1">
+              <a:buNone/>
+            </a:pPr>
+            <a:r>
+              <a:rPr lang="fa-IR" dirty="0">
+                <a:latin typeface="Tahoma" panose="020B0604030504040204" pitchFamily="34" charset="0"/>
+                <a:cs typeface="B Lotus" panose="00000400000000000000" pitchFamily="2" charset="-78"/>
+              </a:rPr>
+              <a:t>راه دیگه برای تعریف آرایه استفاده از دستور </a:t>
+            </a:r>
+            <a:r>
+              <a:rPr lang="en-US" dirty="0" err="1">
+                <a:latin typeface="Tahoma" panose="020B0604030504040204" pitchFamily="34" charset="0"/>
+                <a:cs typeface="B Lotus" panose="00000400000000000000" pitchFamily="2" charset="-78"/>
+              </a:rPr>
+              <a:t>Array.CreateInstance</a:t>
+            </a:r>
+            <a:r>
+              <a:rPr lang="fa-IR" dirty="0">
+                <a:latin typeface="Tahoma" panose="020B0604030504040204" pitchFamily="34" charset="0"/>
+                <a:cs typeface="B Lotus" panose="00000400000000000000" pitchFamily="2" charset="-78"/>
+              </a:rPr>
+              <a:t> هست که هم امکان تعیین نوع اعضای آرایه و هم ابعاد اون رو فراهم میکنه.</a:t>
+            </a:r>
+          </a:p>
+          <a:p>
+            <a:pPr marL="0" indent="0" algn="r" rtl="1">
+              <a:buNone/>
+            </a:pPr>
+            <a:r>
+              <a:rPr lang="fa-IR" dirty="0">
+                <a:latin typeface="Tahoma" panose="020B0604030504040204" pitchFamily="34" charset="0"/>
+                <a:cs typeface="B Lotus" panose="00000400000000000000" pitchFamily="2" charset="-78"/>
+              </a:rPr>
+              <a:t>متدهای </a:t>
+            </a:r>
+            <a:r>
+              <a:rPr lang="en-US" dirty="0" err="1">
+                <a:latin typeface="Tahoma" panose="020B0604030504040204" pitchFamily="34" charset="0"/>
+                <a:cs typeface="B Lotus" panose="00000400000000000000" pitchFamily="2" charset="-78"/>
+              </a:rPr>
+              <a:t>GetValue</a:t>
+            </a:r>
+            <a:r>
+              <a:rPr lang="fa-IR" dirty="0">
+                <a:latin typeface="Tahoma" panose="020B0604030504040204" pitchFamily="34" charset="0"/>
+                <a:cs typeface="B Lotus" panose="00000400000000000000" pitchFamily="2" charset="-78"/>
+              </a:rPr>
+              <a:t> و </a:t>
+            </a:r>
+            <a:r>
+              <a:rPr lang="en-US" dirty="0" err="1">
+                <a:latin typeface="Tahoma" panose="020B0604030504040204" pitchFamily="34" charset="0"/>
+                <a:cs typeface="B Lotus" panose="00000400000000000000" pitchFamily="2" charset="-78"/>
+              </a:rPr>
+              <a:t>SetValue</a:t>
+            </a:r>
+            <a:r>
+              <a:rPr lang="fa-IR" dirty="0">
+                <a:latin typeface="Tahoma" panose="020B0604030504040204" pitchFamily="34" charset="0"/>
+                <a:cs typeface="B Lotus" panose="00000400000000000000" pitchFamily="2" charset="-78"/>
+              </a:rPr>
+              <a:t> به ما اجازه میده که به آیتمهای یک آرایه دسترسی داشته باشیم.</a:t>
+            </a:r>
+          </a:p>
+        </p:txBody>
+      </p:sp>
+      <p:pic>
+        <p:nvPicPr>
+          <p:cNvPr id="6" name="Picture 5">
+            <a:extLst>
+              <a:ext uri="{FF2B5EF4-FFF2-40B4-BE49-F238E27FC236}">
+                <a16:creationId xmlns:a16="http://schemas.microsoft.com/office/drawing/2014/main" id="{65F1817C-5BCB-1B6E-A507-C0B168BC5841}"/>
+              </a:ext>
+            </a:extLst>
+          </p:cNvPr>
+          <p:cNvPicPr>
+            <a:picLocks noChangeAspect="1"/>
+          </p:cNvPicPr>
+          <p:nvPr/>
+        </p:nvPicPr>
+        <p:blipFill>
+          <a:blip r:embed="rId2"/>
+          <a:stretch>
+            <a:fillRect/>
+          </a:stretch>
+        </p:blipFill>
+        <p:spPr>
+          <a:xfrm>
+            <a:off x="1141412" y="2800314"/>
+            <a:ext cx="4536093" cy="971586"/>
+          </a:xfrm>
+          <a:prstGeom prst="rect">
+            <a:avLst/>
+          </a:prstGeom>
+        </p:spPr>
+      </p:pic>
+    </p:spTree>
+    <p:extLst>
+      <p:ext uri="{BB962C8B-B14F-4D97-AF65-F5344CB8AC3E}">
+        <p14:creationId xmlns:p14="http://schemas.microsoft.com/office/powerpoint/2010/main" val="3742704742"/>
+      </p:ext>
+    </p:extLst>
+  </p:cSld>
+  <p:clrMapOvr>
+    <a:masterClrMapping/>
+  </p:clrMapOvr>
+</p:sld>
+</file>
+
+<file path=ppt/slides/slide3.xml><?xml version="1.0" encoding="utf-8"?>
+<p:sld xmlns:a="http://schemas.openxmlformats.org/drawingml/2006/main" xmlns:r="http://schemas.openxmlformats.org/officeDocument/2006/relationships" xmlns:p="http://schemas.openxmlformats.org/presentationml/2006/main">
+  <p:cSld>
+    <p:spTree>
+      <p:nvGrpSpPr>
+        <p:cNvPr id="1" name=""/>
+        <p:cNvGrpSpPr/>
+        <p:nvPr/>
+      </p:nvGrpSpPr>
+      <p:grpSpPr>
+        <a:xfrm>
+          <a:off x="0" y="0"/>
+          <a:ext cx="0" cy="0"/>
+          <a:chOff x="0" y="0"/>
+          <a:chExt cx="0" cy="0"/>
+        </a:xfrm>
+      </p:grpSpPr>
+      <p:sp>
+        <p:nvSpPr>
+          <p:cNvPr id="2" name="Title 1">
+            <a:extLst>
+              <a:ext uri="{FF2B5EF4-FFF2-40B4-BE49-F238E27FC236}">
+                <a16:creationId xmlns:a16="http://schemas.microsoft.com/office/drawing/2014/main" id="{4EF72416-B3DD-920F-1E2D-AC63810A536E}"/>
+              </a:ext>
+            </a:extLst>
+          </p:cNvPr>
+          <p:cNvSpPr>
+            <a:spLocks noGrp="1"/>
+          </p:cNvSpPr>
+          <p:nvPr>
+            <p:ph type="title"/>
+          </p:nvPr>
+        </p:nvSpPr>
+        <p:spPr/>
+        <p:txBody>
+          <a:bodyPr/>
+          <a:lstStyle/>
+          <a:p>
+            <a:pPr algn="ctr"/>
+            <a:r>
+              <a:rPr lang="en-US" cap="none" dirty="0">
+                <a:latin typeface="Tahoma" panose="020B0604030504040204" pitchFamily="34" charset="0"/>
+                <a:cs typeface="B Lotus" panose="00000400000000000000" pitchFamily="2" charset="-78"/>
+              </a:rPr>
+              <a:t>Construction and Indexing</a:t>
+            </a:r>
+          </a:p>
+        </p:txBody>
+      </p:sp>
+      <p:sp>
+        <p:nvSpPr>
+          <p:cNvPr id="3" name="Content Placeholder 2">
+            <a:extLst>
+              <a:ext uri="{FF2B5EF4-FFF2-40B4-BE49-F238E27FC236}">
+                <a16:creationId xmlns:a16="http://schemas.microsoft.com/office/drawing/2014/main" id="{E22DB625-3035-E58A-78AF-734BBE972FEE}"/>
+              </a:ext>
+            </a:extLst>
+          </p:cNvPr>
+          <p:cNvSpPr>
+            <a:spLocks noGrp="1"/>
+          </p:cNvSpPr>
+          <p:nvPr>
+            <p:ph idx="1"/>
+          </p:nvPr>
+        </p:nvSpPr>
+        <p:spPr/>
+        <p:txBody>
+          <a:bodyPr>
+            <a:normAutofit/>
+          </a:bodyPr>
+          <a:lstStyle/>
+          <a:p>
+            <a:pPr marL="0" indent="0" algn="r" rtl="1">
+              <a:buNone/>
+            </a:pPr>
+            <a:r>
+              <a:rPr lang="fa-IR" dirty="0">
+                <a:latin typeface="Tahoma" panose="020B0604030504040204" pitchFamily="34" charset="0"/>
+                <a:cs typeface="B Lotus" panose="00000400000000000000" pitchFamily="2" charset="-78"/>
+              </a:rPr>
+              <a:t>به راحتی میشه آرایه ها رو به نوع هایی که قابل تبدیل هستند تبدیل کرد:</a:t>
+            </a:r>
+          </a:p>
+          <a:p>
+            <a:pPr marL="0" indent="0" algn="r" rtl="1">
+              <a:buNone/>
+            </a:pPr>
+            <a:r>
+              <a:rPr lang="fa-IR" dirty="0">
+                <a:latin typeface="Tahoma" panose="020B0604030504040204" pitchFamily="34" charset="0"/>
+                <a:cs typeface="B Lotus" panose="00000400000000000000" pitchFamily="2" charset="-78"/>
+              </a:rPr>
+              <a:t>مثلا اگه یه کلاس داشته باشیم به اسم </a:t>
+            </a:r>
+            <a:br>
+              <a:rPr lang="en-US" dirty="0">
+                <a:latin typeface="Tahoma" panose="020B0604030504040204" pitchFamily="34" charset="0"/>
+                <a:cs typeface="B Lotus" panose="00000400000000000000" pitchFamily="2" charset="-78"/>
+              </a:rPr>
+            </a:br>
+            <a:r>
+              <a:rPr lang="en-US" dirty="0">
+                <a:latin typeface="Tahoma" panose="020B0604030504040204" pitchFamily="34" charset="0"/>
+                <a:cs typeface="B Lotus" panose="00000400000000000000" pitchFamily="2" charset="-78"/>
+              </a:rPr>
+              <a:t>Apple</a:t>
+            </a:r>
+            <a:r>
+              <a:rPr lang="fa-IR" dirty="0">
+                <a:latin typeface="Tahoma" panose="020B0604030504040204" pitchFamily="34" charset="0"/>
+                <a:cs typeface="B Lotus" panose="00000400000000000000" pitchFamily="2" charset="-78"/>
+              </a:rPr>
+              <a:t> که از کلاس </a:t>
+            </a:r>
+            <a:r>
+              <a:rPr lang="en-US" dirty="0">
+                <a:latin typeface="Tahoma" panose="020B0604030504040204" pitchFamily="34" charset="0"/>
+                <a:cs typeface="B Lotus" panose="00000400000000000000" pitchFamily="2" charset="-78"/>
+              </a:rPr>
+              <a:t>Fruit</a:t>
+            </a:r>
+            <a:r>
+              <a:rPr lang="fa-IR" dirty="0">
+                <a:latin typeface="Tahoma" panose="020B0604030504040204" pitchFamily="34" charset="0"/>
+                <a:cs typeface="B Lotus" panose="00000400000000000000" pitchFamily="2" charset="-78"/>
+              </a:rPr>
+              <a:t> مشتق شده </a:t>
+            </a:r>
+            <a:br>
+              <a:rPr lang="fa-IR" dirty="0">
+                <a:latin typeface="Tahoma" panose="020B0604030504040204" pitchFamily="34" charset="0"/>
+                <a:cs typeface="B Lotus" panose="00000400000000000000" pitchFamily="2" charset="-78"/>
+              </a:rPr>
+            </a:br>
+            <a:r>
+              <a:rPr lang="fa-IR" dirty="0">
+                <a:latin typeface="Tahoma" panose="020B0604030504040204" pitchFamily="34" charset="0"/>
+                <a:cs typeface="B Lotus" panose="00000400000000000000" pitchFamily="2" charset="-78"/>
+              </a:rPr>
+              <a:t>باشه، </a:t>
+            </a:r>
+            <a:r>
+              <a:rPr lang="en-US" dirty="0">
+                <a:latin typeface="Tahoma" panose="020B0604030504040204" pitchFamily="34" charset="0"/>
+                <a:cs typeface="B Lotus" panose="00000400000000000000" pitchFamily="2" charset="-78"/>
+              </a:rPr>
+              <a:t>Apple[]</a:t>
+            </a:r>
+            <a:r>
+              <a:rPr lang="fa-IR" dirty="0">
+                <a:latin typeface="Tahoma" panose="020B0604030504040204" pitchFamily="34" charset="0"/>
+                <a:cs typeface="B Lotus" panose="00000400000000000000" pitchFamily="2" charset="-78"/>
+              </a:rPr>
+              <a:t> میتونه به </a:t>
+            </a:r>
+            <a:r>
+              <a:rPr lang="en-US" dirty="0">
+                <a:latin typeface="Tahoma" panose="020B0604030504040204" pitchFamily="34" charset="0"/>
+                <a:cs typeface="B Lotus" panose="00000400000000000000" pitchFamily="2" charset="-78"/>
+              </a:rPr>
+              <a:t>Fruit[]</a:t>
+            </a:r>
+            <a:br>
+              <a:rPr lang="fa-IR" dirty="0">
+                <a:latin typeface="Tahoma" panose="020B0604030504040204" pitchFamily="34" charset="0"/>
+                <a:cs typeface="B Lotus" panose="00000400000000000000" pitchFamily="2" charset="-78"/>
+              </a:rPr>
+            </a:br>
+            <a:r>
+              <a:rPr lang="fa-IR" dirty="0">
+                <a:latin typeface="Tahoma" panose="020B0604030504040204" pitchFamily="34" charset="0"/>
+                <a:cs typeface="B Lotus" panose="00000400000000000000" pitchFamily="2" charset="-78"/>
+              </a:rPr>
+              <a:t>تبدیل بشه.</a:t>
+            </a:r>
+          </a:p>
+        </p:txBody>
+      </p:sp>
+      <p:pic>
+        <p:nvPicPr>
+          <p:cNvPr id="5" name="Picture 4">
+            <a:extLst>
+              <a:ext uri="{FF2B5EF4-FFF2-40B4-BE49-F238E27FC236}">
+                <a16:creationId xmlns:a16="http://schemas.microsoft.com/office/drawing/2014/main" id="{989D3410-5801-A8C0-2395-9069E648BC89}"/>
+              </a:ext>
+            </a:extLst>
+          </p:cNvPr>
+          <p:cNvPicPr>
+            <a:picLocks noChangeAspect="1"/>
+          </p:cNvPicPr>
+          <p:nvPr/>
+        </p:nvPicPr>
+        <p:blipFill>
+          <a:blip r:embed="rId2"/>
+          <a:stretch>
+            <a:fillRect/>
+          </a:stretch>
+        </p:blipFill>
+        <p:spPr>
+          <a:xfrm>
+            <a:off x="952292" y="2867916"/>
+            <a:ext cx="6013864" cy="1775522"/>
+          </a:xfrm>
+          <a:prstGeom prst="rect">
+            <a:avLst/>
+          </a:prstGeom>
+        </p:spPr>
+      </p:pic>
+    </p:spTree>
+    <p:extLst>
+      <p:ext uri="{BB962C8B-B14F-4D97-AF65-F5344CB8AC3E}">
+        <p14:creationId xmlns:p14="http://schemas.microsoft.com/office/powerpoint/2010/main" val="1298425097"/>
+      </p:ext>
+    </p:extLst>
+  </p:cSld>
+  <p:clrMapOvr>
+    <a:masterClrMapping/>
+  </p:clrMapOvr>
+</p:sld>
+</file>
+
+<file path=ppt/slides/slide4.xml><?xml version="1.0" encoding="utf-8"?>
+<p:sld xmlns:a="http://schemas.openxmlformats.org/drawingml/2006/main" xmlns:r="http://schemas.openxmlformats.org/officeDocument/2006/relationships" xmlns:p="http://schemas.openxmlformats.org/presentationml/2006/main">
+  <p:cSld>
+    <p:spTree>
+      <p:nvGrpSpPr>
+        <p:cNvPr id="1" name=""/>
+        <p:cNvGrpSpPr/>
+        <p:nvPr/>
+      </p:nvGrpSpPr>
+      <p:grpSpPr>
+        <a:xfrm>
+          <a:off x="0" y="0"/>
+          <a:ext cx="0" cy="0"/>
+          <a:chOff x="0" y="0"/>
+          <a:chExt cx="0" cy="0"/>
+        </a:xfrm>
+      </p:grpSpPr>
+      <p:sp>
+        <p:nvSpPr>
+          <p:cNvPr id="2" name="Title 1">
+            <a:extLst>
+              <a:ext uri="{FF2B5EF4-FFF2-40B4-BE49-F238E27FC236}">
+                <a16:creationId xmlns:a16="http://schemas.microsoft.com/office/drawing/2014/main" id="{4EF72416-B3DD-920F-1E2D-AC63810A536E}"/>
+              </a:ext>
+            </a:extLst>
+          </p:cNvPr>
+          <p:cNvSpPr>
+            <a:spLocks noGrp="1"/>
+          </p:cNvSpPr>
+          <p:nvPr>
+            <p:ph type="title"/>
+          </p:nvPr>
+        </p:nvSpPr>
+        <p:spPr/>
+        <p:txBody>
+          <a:bodyPr/>
+          <a:lstStyle/>
+          <a:p>
+            <a:pPr algn="ctr"/>
+            <a:r>
+              <a:rPr lang="en-US" cap="none" dirty="0">
+                <a:latin typeface="Tahoma" panose="020B0604030504040204" pitchFamily="34" charset="0"/>
+                <a:cs typeface="B Lotus" panose="00000400000000000000" pitchFamily="2" charset="-78"/>
+              </a:rPr>
+              <a:t>Construction and Indexing</a:t>
+            </a:r>
+          </a:p>
+        </p:txBody>
+      </p:sp>
+      <p:sp>
+        <p:nvSpPr>
+          <p:cNvPr id="3" name="Content Placeholder 2">
+            <a:extLst>
+              <a:ext uri="{FF2B5EF4-FFF2-40B4-BE49-F238E27FC236}">
+                <a16:creationId xmlns:a16="http://schemas.microsoft.com/office/drawing/2014/main" id="{E22DB625-3035-E58A-78AF-734BBE972FEE}"/>
+              </a:ext>
+            </a:extLst>
+          </p:cNvPr>
+          <p:cNvSpPr>
+            <a:spLocks noGrp="1"/>
+          </p:cNvSpPr>
+          <p:nvPr>
+            <p:ph idx="1"/>
+          </p:nvPr>
+        </p:nvSpPr>
+        <p:spPr/>
+        <p:txBody>
+          <a:bodyPr>
+            <a:normAutofit/>
+          </a:bodyPr>
+          <a:lstStyle/>
+          <a:p>
+            <a:pPr marL="0" indent="0" algn="r" rtl="1">
+              <a:buNone/>
+            </a:pPr>
+            <a:r>
+              <a:rPr lang="fa-IR" dirty="0">
+                <a:latin typeface="Tahoma" panose="020B0604030504040204" pitchFamily="34" charset="0"/>
+                <a:cs typeface="B Lotus" panose="00000400000000000000" pitchFamily="2" charset="-78"/>
+              </a:rPr>
+              <a:t>این مثال یه متد رو تعریف میکنه که آیتم اول آرایه (یک بعدی یا چند بعدی) رو برمیگردونه:</a:t>
+            </a:r>
+          </a:p>
+        </p:txBody>
+      </p:sp>
+      <p:pic>
+        <p:nvPicPr>
+          <p:cNvPr id="6" name="Picture 5">
+            <a:extLst>
+              <a:ext uri="{FF2B5EF4-FFF2-40B4-BE49-F238E27FC236}">
+                <a16:creationId xmlns:a16="http://schemas.microsoft.com/office/drawing/2014/main" id="{3EDA5A26-9D28-65E2-352D-5CCB9AC5DB90}"/>
+              </a:ext>
+            </a:extLst>
+          </p:cNvPr>
+          <p:cNvPicPr>
+            <a:picLocks noChangeAspect="1"/>
+          </p:cNvPicPr>
+          <p:nvPr/>
+        </p:nvPicPr>
+        <p:blipFill>
+          <a:blip r:embed="rId2"/>
+          <a:stretch>
+            <a:fillRect/>
+          </a:stretch>
+        </p:blipFill>
+        <p:spPr>
+          <a:xfrm>
+            <a:off x="1709521" y="2852596"/>
+            <a:ext cx="4991533" cy="3238781"/>
+          </a:xfrm>
+          <a:prstGeom prst="rect">
+            <a:avLst/>
+          </a:prstGeom>
+        </p:spPr>
+      </p:pic>
+    </p:spTree>
+    <p:extLst>
+      <p:ext uri="{BB962C8B-B14F-4D97-AF65-F5344CB8AC3E}">
+        <p14:creationId xmlns:p14="http://schemas.microsoft.com/office/powerpoint/2010/main" val="2206933710"/>
+      </p:ext>
+    </p:extLst>
+  </p:cSld>
+  <p:clrMapOvr>
+    <a:masterClrMapping/>
+  </p:clrMapOvr>
+</p:sld>
+</file>
+
+<file path=ppt/slides/slide5.xml><?xml version="1.0" encoding="utf-8"?>
+<p:sld xmlns:a="http://schemas.openxmlformats.org/drawingml/2006/main" xmlns:r="http://schemas.openxmlformats.org/officeDocument/2006/relationships" xmlns:p="http://schemas.openxmlformats.org/presentationml/2006/main">
+  <p:cSld>
+    <p:spTree>
+      <p:nvGrpSpPr>
+        <p:cNvPr id="1" name=""/>
+        <p:cNvGrpSpPr/>
+        <p:nvPr/>
+      </p:nvGrpSpPr>
+      <p:grpSpPr>
+        <a:xfrm>
+          <a:off x="0" y="0"/>
+          <a:ext cx="0" cy="0"/>
+          <a:chOff x="0" y="0"/>
+          <a:chExt cx="0" cy="0"/>
+        </a:xfrm>
+      </p:grpSpPr>
+      <p:sp>
+        <p:nvSpPr>
+          <p:cNvPr id="2" name="Title 1">
+            <a:extLst>
+              <a:ext uri="{FF2B5EF4-FFF2-40B4-BE49-F238E27FC236}">
+                <a16:creationId xmlns:a16="http://schemas.microsoft.com/office/drawing/2014/main" id="{4EF72416-B3DD-920F-1E2D-AC63810A536E}"/>
+              </a:ext>
+            </a:extLst>
+          </p:cNvPr>
+          <p:cNvSpPr>
+            <a:spLocks noGrp="1"/>
+          </p:cNvSpPr>
+          <p:nvPr>
+            <p:ph type="title"/>
+          </p:nvPr>
+        </p:nvSpPr>
+        <p:spPr/>
+        <p:txBody>
+          <a:bodyPr/>
+          <a:lstStyle/>
+          <a:p>
+            <a:pPr algn="ctr"/>
+            <a:r>
+              <a:rPr lang="en-US" cap="none" dirty="0">
+                <a:latin typeface="Tahoma" panose="020B0604030504040204" pitchFamily="34" charset="0"/>
+                <a:cs typeface="B Lotus" panose="00000400000000000000" pitchFamily="2" charset="-78"/>
+              </a:rPr>
+              <a:t>Enumeration</a:t>
+            </a:r>
+          </a:p>
+        </p:txBody>
+      </p:sp>
+      <p:sp>
+        <p:nvSpPr>
+          <p:cNvPr id="3" name="Content Placeholder 2">
+            <a:extLst>
+              <a:ext uri="{FF2B5EF4-FFF2-40B4-BE49-F238E27FC236}">
+                <a16:creationId xmlns:a16="http://schemas.microsoft.com/office/drawing/2014/main" id="{E22DB625-3035-E58A-78AF-734BBE972FEE}"/>
+              </a:ext>
+            </a:extLst>
+          </p:cNvPr>
+          <p:cNvSpPr>
+            <a:spLocks noGrp="1"/>
+          </p:cNvSpPr>
+          <p:nvPr>
+            <p:ph idx="1"/>
+          </p:nvPr>
+        </p:nvSpPr>
+        <p:spPr/>
+        <p:txBody>
+          <a:bodyPr>
+            <a:normAutofit/>
+          </a:bodyPr>
+          <a:lstStyle/>
+          <a:p>
+            <a:pPr marL="0" indent="0" algn="r" rtl="1">
+              <a:buNone/>
+            </a:pPr>
+            <a:r>
+              <a:rPr lang="fa-IR" dirty="0">
+                <a:latin typeface="Tahoma" panose="020B0604030504040204" pitchFamily="34" charset="0"/>
+                <a:cs typeface="B Lotus" panose="00000400000000000000" pitchFamily="2" charset="-78"/>
+              </a:rPr>
+              <a:t>آرایه‌ها به راحتی میتونند با </a:t>
+            </a:r>
+            <a:r>
+              <a:rPr lang="en-US" dirty="0">
+                <a:latin typeface="Tahoma" panose="020B0604030504040204" pitchFamily="34" charset="0"/>
+                <a:cs typeface="B Lotus" panose="00000400000000000000" pitchFamily="2" charset="-78"/>
+              </a:rPr>
+              <a:t>foreach</a:t>
+            </a:r>
+            <a:r>
+              <a:rPr lang="fa-IR" dirty="0">
+                <a:latin typeface="Tahoma" panose="020B0604030504040204" pitchFamily="34" charset="0"/>
+                <a:cs typeface="B Lotus" panose="00000400000000000000" pitchFamily="2" charset="-78"/>
+              </a:rPr>
+              <a:t> استفاده بشن</a:t>
+            </a:r>
+            <a:endParaRPr lang="en-US" dirty="0">
+              <a:latin typeface="Tahoma" panose="020B0604030504040204" pitchFamily="34" charset="0"/>
+              <a:cs typeface="B Lotus" panose="00000400000000000000" pitchFamily="2" charset="-78"/>
+            </a:endParaRPr>
+          </a:p>
+          <a:p>
+            <a:pPr marL="0" indent="0" algn="r" rtl="1">
+              <a:buNone/>
+            </a:pPr>
+            <a:r>
+              <a:rPr lang="fa-IR" dirty="0">
+                <a:latin typeface="Tahoma" panose="020B0604030504040204" pitchFamily="34" charset="0"/>
+                <a:cs typeface="B Lotus" panose="00000400000000000000" pitchFamily="2" charset="-78"/>
+              </a:rPr>
+              <a:t>همینطور میتونیم از متد استاتیک </a:t>
+            </a:r>
+            <a:r>
+              <a:rPr lang="en-US" dirty="0" err="1">
+                <a:latin typeface="Tahoma" panose="020B0604030504040204" pitchFamily="34" charset="0"/>
+                <a:cs typeface="B Lotus" panose="00000400000000000000" pitchFamily="2" charset="-78"/>
+              </a:rPr>
+              <a:t>Array.Foreach</a:t>
+            </a:r>
+            <a:br>
+              <a:rPr lang="fa-IR" dirty="0">
+                <a:latin typeface="Tahoma" panose="020B0604030504040204" pitchFamily="34" charset="0"/>
+                <a:cs typeface="B Lotus" panose="00000400000000000000" pitchFamily="2" charset="-78"/>
+              </a:rPr>
+            </a:br>
+            <a:r>
+              <a:rPr lang="fa-IR" dirty="0">
+                <a:latin typeface="Tahoma" panose="020B0604030504040204" pitchFamily="34" charset="0"/>
+                <a:cs typeface="B Lotus" panose="00000400000000000000" pitchFamily="2" charset="-78"/>
+              </a:rPr>
+              <a:t>استفاده کنیم. این متد دو ورودی دارد. ورودی اول آرایه</a:t>
+            </a:r>
+            <a:br>
+              <a:rPr lang="fa-IR" dirty="0">
+                <a:latin typeface="Tahoma" panose="020B0604030504040204" pitchFamily="34" charset="0"/>
+                <a:cs typeface="B Lotus" panose="00000400000000000000" pitchFamily="2" charset="-78"/>
+              </a:rPr>
+            </a:br>
+            <a:r>
+              <a:rPr lang="fa-IR" dirty="0">
+                <a:latin typeface="Tahoma" panose="020B0604030504040204" pitchFamily="34" charset="0"/>
+                <a:cs typeface="B Lotus" panose="00000400000000000000" pitchFamily="2" charset="-78"/>
+              </a:rPr>
+              <a:t>و ورودی دوم یک </a:t>
+            </a:r>
+            <a:r>
+              <a:rPr lang="en-US" dirty="0">
+                <a:latin typeface="Tahoma" panose="020B0604030504040204" pitchFamily="34" charset="0"/>
+                <a:cs typeface="B Lotus" panose="00000400000000000000" pitchFamily="2" charset="-78"/>
+              </a:rPr>
+              <a:t>Action</a:t>
+            </a:r>
+            <a:r>
+              <a:rPr lang="fa-IR" dirty="0">
+                <a:latin typeface="Tahoma" panose="020B0604030504040204" pitchFamily="34" charset="0"/>
+                <a:cs typeface="B Lotus" panose="00000400000000000000" pitchFamily="2" charset="-78"/>
+              </a:rPr>
+              <a:t> هست.</a:t>
+            </a:r>
+          </a:p>
+          <a:p>
+            <a:pPr marL="0" indent="0" algn="r" rtl="1">
+              <a:buNone/>
+            </a:pPr>
+            <a:br>
+              <a:rPr lang="fa-IR" dirty="0">
+                <a:latin typeface="Tahoma" panose="020B0604030504040204" pitchFamily="34" charset="0"/>
+                <a:cs typeface="B Lotus" panose="00000400000000000000" pitchFamily="2" charset="-78"/>
+              </a:rPr>
+            </a:br>
+            <a:r>
+              <a:rPr lang="fa-IR" dirty="0">
+                <a:latin typeface="Tahoma" panose="020B0604030504040204" pitchFamily="34" charset="0"/>
+                <a:cs typeface="B Lotus" panose="00000400000000000000" pitchFamily="2" charset="-78"/>
+              </a:rPr>
+              <a:t>(</a:t>
+            </a:r>
+            <a:r>
+              <a:rPr lang="fa-IR" dirty="0">
+                <a:solidFill>
+                  <a:srgbClr val="FFC000"/>
+                </a:solidFill>
+                <a:latin typeface="Tahoma" panose="020B0604030504040204" pitchFamily="34" charset="0"/>
+                <a:cs typeface="B Lotus" panose="00000400000000000000" pitchFamily="2" charset="-78"/>
+              </a:rPr>
+              <a:t>اگه </a:t>
+            </a:r>
+            <a:r>
+              <a:rPr lang="en-US" dirty="0">
+                <a:solidFill>
+                  <a:srgbClr val="FFC000"/>
+                </a:solidFill>
+                <a:latin typeface="Tahoma" panose="020B0604030504040204" pitchFamily="34" charset="0"/>
+                <a:cs typeface="B Lotus" panose="00000400000000000000" pitchFamily="2" charset="-78"/>
+              </a:rPr>
+              <a:t>Action</a:t>
+            </a:r>
+            <a:r>
+              <a:rPr lang="fa-IR" dirty="0">
+                <a:solidFill>
+                  <a:srgbClr val="FFC000"/>
+                </a:solidFill>
+                <a:latin typeface="Tahoma" panose="020B0604030504040204" pitchFamily="34" charset="0"/>
+                <a:cs typeface="B Lotus" panose="00000400000000000000" pitchFamily="2" charset="-78"/>
+              </a:rPr>
+              <a:t> رو نمیشناسید پست مربوط به </a:t>
+            </a:r>
+            <a:r>
+              <a:rPr lang="en-US" dirty="0">
+                <a:solidFill>
+                  <a:srgbClr val="FFC000"/>
+                </a:solidFill>
+                <a:latin typeface="Tahoma" panose="020B0604030504040204" pitchFamily="34" charset="0"/>
+                <a:cs typeface="B Lotus" panose="00000400000000000000" pitchFamily="2" charset="-78"/>
+              </a:rPr>
+              <a:t>delegate</a:t>
+            </a:r>
+            <a:r>
+              <a:rPr lang="fa-IR" dirty="0">
+                <a:solidFill>
+                  <a:srgbClr val="FFC000"/>
+                </a:solidFill>
+                <a:latin typeface="Tahoma" panose="020B0604030504040204" pitchFamily="34" charset="0"/>
+                <a:cs typeface="B Lotus" panose="00000400000000000000" pitchFamily="2" charset="-78"/>
+              </a:rPr>
+              <a:t> ها رو یه نگاه بندازید</a:t>
+            </a:r>
+            <a:r>
+              <a:rPr lang="fa-IR" dirty="0">
+                <a:latin typeface="Tahoma" panose="020B0604030504040204" pitchFamily="34" charset="0"/>
+                <a:cs typeface="B Lotus" panose="00000400000000000000" pitchFamily="2" charset="-78"/>
+              </a:rPr>
+              <a:t>)</a:t>
+            </a:r>
+          </a:p>
+        </p:txBody>
+      </p:sp>
+      <p:pic>
+        <p:nvPicPr>
+          <p:cNvPr id="8" name="Picture 7">
+            <a:extLst>
+              <a:ext uri="{FF2B5EF4-FFF2-40B4-BE49-F238E27FC236}">
+                <a16:creationId xmlns:a16="http://schemas.microsoft.com/office/drawing/2014/main" id="{DA5273AA-E0DD-46FB-1964-1E47A2EE17A8}"/>
+              </a:ext>
+            </a:extLst>
+          </p:cNvPr>
+          <p:cNvPicPr>
+            <a:picLocks noChangeAspect="1"/>
+          </p:cNvPicPr>
+          <p:nvPr/>
+        </p:nvPicPr>
+        <p:blipFill>
+          <a:blip r:embed="rId2"/>
+          <a:stretch>
+            <a:fillRect/>
+          </a:stretch>
+        </p:blipFill>
+        <p:spPr>
+          <a:xfrm>
+            <a:off x="1457165" y="2400222"/>
+            <a:ext cx="4343560" cy="2082223"/>
+          </a:xfrm>
+          <a:prstGeom prst="rect">
+            <a:avLst/>
+          </a:prstGeom>
+        </p:spPr>
+      </p:pic>
+    </p:spTree>
+    <p:extLst>
+      <p:ext uri="{BB962C8B-B14F-4D97-AF65-F5344CB8AC3E}">
+        <p14:creationId xmlns:p14="http://schemas.microsoft.com/office/powerpoint/2010/main" val="3716346169"/>
+      </p:ext>
+    </p:extLst>
+  </p:cSld>
+  <p:clrMapOvr>
+    <a:masterClrMapping/>
+  </p:clrMapOvr>
+</p:sld>
+</file>
+
+<file path=ppt/slides/slide6.xml><?xml version="1.0" encoding="utf-8"?>
+<p:sld xmlns:a="http://schemas.openxmlformats.org/drawingml/2006/main" xmlns:r="http://schemas.openxmlformats.org/officeDocument/2006/relationships" xmlns:p="http://schemas.openxmlformats.org/presentationml/2006/main">
+  <p:cSld>
+    <p:spTree>
+      <p:nvGrpSpPr>
+        <p:cNvPr id="1" name=""/>
+        <p:cNvGrpSpPr/>
+        <p:nvPr/>
+      </p:nvGrpSpPr>
+      <p:grpSpPr>
+        <a:xfrm>
+          <a:off x="0" y="0"/>
+          <a:ext cx="0" cy="0"/>
+          <a:chOff x="0" y="0"/>
+          <a:chExt cx="0" cy="0"/>
+        </a:xfrm>
+      </p:grpSpPr>
+      <p:sp>
+        <p:nvSpPr>
+          <p:cNvPr id="2" name="Title 1">
+            <a:extLst>
+              <a:ext uri="{FF2B5EF4-FFF2-40B4-BE49-F238E27FC236}">
+                <a16:creationId xmlns:a16="http://schemas.microsoft.com/office/drawing/2014/main" id="{4EF72416-B3DD-920F-1E2D-AC63810A536E}"/>
+              </a:ext>
+            </a:extLst>
+          </p:cNvPr>
+          <p:cNvSpPr>
+            <a:spLocks noGrp="1"/>
+          </p:cNvSpPr>
+          <p:nvPr>
+            <p:ph type="title"/>
+          </p:nvPr>
+        </p:nvSpPr>
+        <p:spPr/>
+        <p:txBody>
+          <a:bodyPr/>
+          <a:lstStyle/>
+          <a:p>
+            <a:pPr algn="ctr"/>
+            <a:r>
+              <a:rPr lang="en-US" cap="none" dirty="0">
+                <a:latin typeface="Tahoma" panose="020B0604030504040204" pitchFamily="34" charset="0"/>
+                <a:cs typeface="B Lotus" panose="00000400000000000000" pitchFamily="2" charset="-78"/>
+              </a:rPr>
+              <a:t>Length and Rank</a:t>
+            </a:r>
+          </a:p>
+        </p:txBody>
+      </p:sp>
+      <p:sp>
+        <p:nvSpPr>
+          <p:cNvPr id="3" name="Content Placeholder 2">
+            <a:extLst>
+              <a:ext uri="{FF2B5EF4-FFF2-40B4-BE49-F238E27FC236}">
+                <a16:creationId xmlns:a16="http://schemas.microsoft.com/office/drawing/2014/main" id="{E22DB625-3035-E58A-78AF-734BBE972FEE}"/>
+              </a:ext>
+            </a:extLst>
+          </p:cNvPr>
+          <p:cNvSpPr>
+            <a:spLocks noGrp="1"/>
+          </p:cNvSpPr>
+          <p:nvPr>
+            <p:ph idx="1"/>
+          </p:nvPr>
+        </p:nvSpPr>
+        <p:spPr/>
+        <p:txBody>
+          <a:bodyPr>
+            <a:normAutofit/>
+          </a:bodyPr>
+          <a:lstStyle/>
+          <a:p>
+            <a:pPr marL="0" indent="0" algn="r" rtl="1">
+              <a:buNone/>
+            </a:pPr>
+            <a:r>
+              <a:rPr lang="fa-IR" dirty="0">
+                <a:latin typeface="Tahoma" panose="020B0604030504040204" pitchFamily="34" charset="0"/>
+                <a:cs typeface="B Lotus" panose="00000400000000000000" pitchFamily="2" charset="-78"/>
+              </a:rPr>
+              <a:t>متد </a:t>
+            </a:r>
+            <a:r>
+              <a:rPr lang="en-US" dirty="0" err="1">
+                <a:latin typeface="Tahoma" panose="020B0604030504040204" pitchFamily="34" charset="0"/>
+                <a:cs typeface="B Lotus" panose="00000400000000000000" pitchFamily="2" charset="-78"/>
+              </a:rPr>
+              <a:t>GetLength</a:t>
+            </a:r>
+            <a:r>
+              <a:rPr lang="fa-IR" dirty="0">
+                <a:latin typeface="Tahoma" panose="020B0604030504040204" pitchFamily="34" charset="0"/>
+                <a:cs typeface="B Lotus" panose="00000400000000000000" pitchFamily="2" charset="-78"/>
+              </a:rPr>
+              <a:t> و </a:t>
+            </a:r>
+            <a:r>
+              <a:rPr lang="en-US" dirty="0" err="1">
+                <a:latin typeface="Tahoma" panose="020B0604030504040204" pitchFamily="34" charset="0"/>
+                <a:cs typeface="B Lotus" panose="00000400000000000000" pitchFamily="2" charset="-78"/>
+              </a:rPr>
+              <a:t>GetLongLength</a:t>
+            </a:r>
+            <a:r>
+              <a:rPr lang="fa-IR" dirty="0">
+                <a:latin typeface="Tahoma" panose="020B0604030504040204" pitchFamily="34" charset="0"/>
+                <a:cs typeface="B Lotus" panose="00000400000000000000" pitchFamily="2" charset="-78"/>
+              </a:rPr>
+              <a:t> اندازه یک بعد آرایه رو برمیگردونه، پراپرتی‎های </a:t>
+            </a:r>
+            <a:r>
+              <a:rPr lang="en-US" dirty="0">
+                <a:latin typeface="Tahoma" panose="020B0604030504040204" pitchFamily="34" charset="0"/>
+                <a:cs typeface="B Lotus" panose="00000400000000000000" pitchFamily="2" charset="-78"/>
+              </a:rPr>
+              <a:t>Length</a:t>
+            </a:r>
+            <a:r>
+              <a:rPr lang="fa-IR" dirty="0">
+                <a:latin typeface="Tahoma" panose="020B0604030504040204" pitchFamily="34" charset="0"/>
+                <a:cs typeface="B Lotus" panose="00000400000000000000" pitchFamily="2" charset="-78"/>
+              </a:rPr>
+              <a:t> و </a:t>
+            </a:r>
+            <a:r>
+              <a:rPr lang="en-US" dirty="0" err="1">
+                <a:latin typeface="Tahoma" panose="020B0604030504040204" pitchFamily="34" charset="0"/>
+                <a:cs typeface="B Lotus" panose="00000400000000000000" pitchFamily="2" charset="-78"/>
+              </a:rPr>
+              <a:t>LongLength</a:t>
+            </a:r>
+            <a:r>
+              <a:rPr lang="fa-IR" dirty="0">
+                <a:latin typeface="Tahoma" panose="020B0604030504040204" pitchFamily="34" charset="0"/>
+                <a:cs typeface="B Lotus" panose="00000400000000000000" pitchFamily="2" charset="-78"/>
+              </a:rPr>
+              <a:t> مجموع تعداد آیتم‌های همه ابعاد آرایه رو برمیگردونه. </a:t>
+            </a:r>
+          </a:p>
+        </p:txBody>
+      </p:sp>
+      <p:pic>
+        <p:nvPicPr>
+          <p:cNvPr id="5" name="Picture 4">
+            <a:extLst>
+              <a:ext uri="{FF2B5EF4-FFF2-40B4-BE49-F238E27FC236}">
+                <a16:creationId xmlns:a16="http://schemas.microsoft.com/office/drawing/2014/main" id="{1625F24D-C5D1-5412-9AE3-5B7C7B9F69C4}"/>
+              </a:ext>
+            </a:extLst>
+          </p:cNvPr>
+          <p:cNvPicPr>
+            <a:picLocks noChangeAspect="1"/>
+          </p:cNvPicPr>
+          <p:nvPr/>
+        </p:nvPicPr>
+        <p:blipFill>
+          <a:blip r:embed="rId2"/>
+          <a:stretch>
+            <a:fillRect/>
+          </a:stretch>
+        </p:blipFill>
+        <p:spPr>
+          <a:xfrm>
+            <a:off x="3304933" y="4039500"/>
+            <a:ext cx="6547889" cy="1399275"/>
+          </a:xfrm>
+          <a:prstGeom prst="rect">
+            <a:avLst/>
+          </a:prstGeom>
+        </p:spPr>
+      </p:pic>
+    </p:spTree>
+    <p:extLst>
+      <p:ext uri="{BB962C8B-B14F-4D97-AF65-F5344CB8AC3E}">
+        <p14:creationId xmlns:p14="http://schemas.microsoft.com/office/powerpoint/2010/main" val="3693256501"/>
+      </p:ext>
+    </p:extLst>
+  </p:cSld>
+  <p:clrMapOvr>
+    <a:masterClrMapping/>
+  </p:clrMapOvr>
+</p:sld>
+</file>
+
+<file path=ppt/slides/slide7.xml><?xml version="1.0" encoding="utf-8"?>
+<p:sld xmlns:a="http://schemas.openxmlformats.org/drawingml/2006/main" xmlns:r="http://schemas.openxmlformats.org/officeDocument/2006/relationships" xmlns:p="http://schemas.openxmlformats.org/presentationml/2006/main">
+  <p:cSld>
+    <p:spTree>
+      <p:nvGrpSpPr>
+        <p:cNvPr id="1" name=""/>
+        <p:cNvGrpSpPr/>
+        <p:nvPr/>
+      </p:nvGrpSpPr>
+      <p:grpSpPr>
+        <a:xfrm>
+          <a:off x="0" y="0"/>
+          <a:ext cx="0" cy="0"/>
+          <a:chOff x="0" y="0"/>
+          <a:chExt cx="0" cy="0"/>
+        </a:xfrm>
+      </p:grpSpPr>
+      <p:sp>
+        <p:nvSpPr>
+          <p:cNvPr id="2" name="Title 1">
+            <a:extLst>
+              <a:ext uri="{FF2B5EF4-FFF2-40B4-BE49-F238E27FC236}">
+                <a16:creationId xmlns:a16="http://schemas.microsoft.com/office/drawing/2014/main" id="{4EF72416-B3DD-920F-1E2D-AC63810A536E}"/>
+              </a:ext>
+            </a:extLst>
+          </p:cNvPr>
+          <p:cNvSpPr>
+            <a:spLocks noGrp="1"/>
+          </p:cNvSpPr>
+          <p:nvPr>
+            <p:ph type="title"/>
+          </p:nvPr>
+        </p:nvSpPr>
+        <p:spPr/>
+        <p:txBody>
+          <a:bodyPr/>
+          <a:lstStyle/>
+          <a:p>
+            <a:pPr algn="ctr"/>
+            <a:r>
+              <a:rPr lang="en-US" cap="none" dirty="0">
+                <a:latin typeface="Tahoma" panose="020B0604030504040204" pitchFamily="34" charset="0"/>
+                <a:cs typeface="B Lotus" panose="00000400000000000000" pitchFamily="2" charset="-78"/>
+              </a:rPr>
+              <a:t>Searching</a:t>
+            </a:r>
+          </a:p>
+        </p:txBody>
+      </p:sp>
+      <p:sp>
+        <p:nvSpPr>
+          <p:cNvPr id="3" name="Content Placeholder 2">
+            <a:extLst>
+              <a:ext uri="{FF2B5EF4-FFF2-40B4-BE49-F238E27FC236}">
+                <a16:creationId xmlns:a16="http://schemas.microsoft.com/office/drawing/2014/main" id="{E22DB625-3035-E58A-78AF-734BBE972FEE}"/>
+              </a:ext>
+            </a:extLst>
+          </p:cNvPr>
+          <p:cNvSpPr>
+            <a:spLocks noGrp="1"/>
+          </p:cNvSpPr>
+          <p:nvPr>
+            <p:ph idx="1"/>
+          </p:nvPr>
+        </p:nvSpPr>
+        <p:spPr/>
+        <p:txBody>
+          <a:bodyPr>
+            <a:normAutofit lnSpcReduction="10000"/>
+          </a:bodyPr>
+          <a:lstStyle/>
+          <a:p>
+            <a:pPr marL="0" indent="0" algn="r" rtl="1">
+              <a:buNone/>
+            </a:pPr>
+            <a:r>
+              <a:rPr lang="fa-IR" dirty="0">
+                <a:latin typeface="Tahoma" panose="020B0604030504040204" pitchFamily="34" charset="0"/>
+                <a:cs typeface="B Lotus" panose="00000400000000000000" pitchFamily="2" charset="-78"/>
+              </a:rPr>
+              <a:t>کلاس </a:t>
+            </a:r>
+            <a:r>
+              <a:rPr lang="en-US" dirty="0">
+                <a:latin typeface="Tahoma" panose="020B0604030504040204" pitchFamily="34" charset="0"/>
+                <a:cs typeface="B Lotus" panose="00000400000000000000" pitchFamily="2" charset="-78"/>
+              </a:rPr>
+              <a:t>Array</a:t>
+            </a:r>
+            <a:r>
+              <a:rPr lang="fa-IR" dirty="0">
+                <a:latin typeface="Tahoma" panose="020B0604030504040204" pitchFamily="34" charset="0"/>
+                <a:cs typeface="B Lotus" panose="00000400000000000000" pitchFamily="2" charset="-78"/>
+              </a:rPr>
+              <a:t> برای پیدا کردن یک عنصر در یک بعد از آرایه راهکارهای مختلفی رو ارائه میده:</a:t>
+            </a:r>
+          </a:p>
+          <a:p>
+            <a:pPr algn="r" rtl="1"/>
+            <a:r>
+              <a:rPr lang="en-US" dirty="0" err="1">
+                <a:latin typeface="Tahoma" panose="020B0604030504040204" pitchFamily="34" charset="0"/>
+                <a:cs typeface="B Lotus" panose="00000400000000000000" pitchFamily="2" charset="-78"/>
+              </a:rPr>
+              <a:t>BinarySearch</a:t>
+            </a:r>
+            <a:r>
+              <a:rPr lang="en-US" dirty="0">
+                <a:latin typeface="Tahoma" panose="020B0604030504040204" pitchFamily="34" charset="0"/>
+                <a:cs typeface="B Lotus" panose="00000400000000000000" pitchFamily="2" charset="-78"/>
+              </a:rPr>
+              <a:t> methods</a:t>
+            </a:r>
+            <a:br>
+              <a:rPr lang="fa-IR" dirty="0">
+                <a:latin typeface="Tahoma" panose="020B0604030504040204" pitchFamily="34" charset="0"/>
+                <a:cs typeface="B Lotus" panose="00000400000000000000" pitchFamily="2" charset="-78"/>
+              </a:rPr>
+            </a:br>
+            <a:r>
+              <a:rPr lang="fa-IR" dirty="0">
+                <a:latin typeface="Tahoma" panose="020B0604030504040204" pitchFamily="34" charset="0"/>
+                <a:cs typeface="B Lotus" panose="00000400000000000000" pitchFamily="2" charset="-78"/>
+              </a:rPr>
+              <a:t>برای جستجوی سریع یک عنصر در یک آرایه مرتب</a:t>
+            </a:r>
+          </a:p>
+          <a:p>
+            <a:pPr algn="r" rtl="1"/>
+            <a:r>
+              <a:rPr lang="en-US" dirty="0" err="1">
+                <a:latin typeface="Tahoma" panose="020B0604030504040204" pitchFamily="34" charset="0"/>
+                <a:cs typeface="B Lotus" panose="00000400000000000000" pitchFamily="2" charset="-78"/>
+              </a:rPr>
+              <a:t>IndexOf</a:t>
+            </a:r>
+            <a:r>
+              <a:rPr lang="en-US" dirty="0">
+                <a:latin typeface="Tahoma" panose="020B0604030504040204" pitchFamily="34" charset="0"/>
+                <a:cs typeface="B Lotus" panose="00000400000000000000" pitchFamily="2" charset="-78"/>
+              </a:rPr>
+              <a:t>/</a:t>
+            </a:r>
+            <a:r>
+              <a:rPr lang="en-US" dirty="0" err="1">
+                <a:latin typeface="Tahoma" panose="020B0604030504040204" pitchFamily="34" charset="0"/>
+                <a:cs typeface="B Lotus" panose="00000400000000000000" pitchFamily="2" charset="-78"/>
+              </a:rPr>
+              <a:t>LastIndex</a:t>
+            </a:r>
+            <a:r>
+              <a:rPr lang="en-US" dirty="0">
+                <a:latin typeface="Tahoma" panose="020B0604030504040204" pitchFamily="34" charset="0"/>
+                <a:cs typeface="B Lotus" panose="00000400000000000000" pitchFamily="2" charset="-78"/>
+              </a:rPr>
+              <a:t> methods</a:t>
+            </a:r>
+            <a:br>
+              <a:rPr lang="fa-IR" dirty="0">
+                <a:latin typeface="Tahoma" panose="020B0604030504040204" pitchFamily="34" charset="0"/>
+                <a:cs typeface="B Lotus" panose="00000400000000000000" pitchFamily="2" charset="-78"/>
+              </a:rPr>
+            </a:br>
+            <a:r>
+              <a:rPr lang="fa-IR" dirty="0">
+                <a:latin typeface="Tahoma" panose="020B0604030504040204" pitchFamily="34" charset="0"/>
+                <a:cs typeface="B Lotus" panose="00000400000000000000" pitchFamily="2" charset="-78"/>
+              </a:rPr>
+              <a:t>برای جستجوی یک عنصر در آرایه نامرتب</a:t>
+            </a:r>
+          </a:p>
+          <a:p>
+            <a:pPr algn="r" rtl="1"/>
+            <a:r>
+              <a:rPr lang="en-US" dirty="0">
+                <a:latin typeface="Tahoma" panose="020B0604030504040204" pitchFamily="34" charset="0"/>
+                <a:cs typeface="B Lotus" panose="00000400000000000000" pitchFamily="2" charset="-78"/>
+              </a:rPr>
+              <a:t>Find/</a:t>
+            </a:r>
+            <a:r>
+              <a:rPr lang="en-US" dirty="0" err="1">
+                <a:latin typeface="Tahoma" panose="020B0604030504040204" pitchFamily="34" charset="0"/>
+                <a:cs typeface="B Lotus" panose="00000400000000000000" pitchFamily="2" charset="-78"/>
+              </a:rPr>
+              <a:t>FindLast</a:t>
+            </a:r>
+            <a:r>
+              <a:rPr lang="en-US" dirty="0">
+                <a:latin typeface="Tahoma" panose="020B0604030504040204" pitchFamily="34" charset="0"/>
+                <a:cs typeface="B Lotus" panose="00000400000000000000" pitchFamily="2" charset="-78"/>
+              </a:rPr>
+              <a:t>/</a:t>
+            </a:r>
+            <a:r>
+              <a:rPr lang="en-US" dirty="0" err="1">
+                <a:latin typeface="Tahoma" panose="020B0604030504040204" pitchFamily="34" charset="0"/>
+                <a:cs typeface="B Lotus" panose="00000400000000000000" pitchFamily="2" charset="-78"/>
+              </a:rPr>
+              <a:t>FindIndex</a:t>
+            </a:r>
+            <a:r>
+              <a:rPr lang="en-US" dirty="0">
+                <a:latin typeface="Tahoma" panose="020B0604030504040204" pitchFamily="34" charset="0"/>
+                <a:cs typeface="B Lotus" panose="00000400000000000000" pitchFamily="2" charset="-78"/>
+              </a:rPr>
+              <a:t>/</a:t>
+            </a:r>
+            <a:r>
+              <a:rPr lang="en-US" dirty="0" err="1">
+                <a:latin typeface="Tahoma" panose="020B0604030504040204" pitchFamily="34" charset="0"/>
+                <a:cs typeface="B Lotus" panose="00000400000000000000" pitchFamily="2" charset="-78"/>
+              </a:rPr>
+              <a:t>FindLastIndex</a:t>
+            </a:r>
+            <a:r>
+              <a:rPr lang="en-US" dirty="0">
+                <a:latin typeface="Tahoma" panose="020B0604030504040204" pitchFamily="34" charset="0"/>
+                <a:cs typeface="B Lotus" panose="00000400000000000000" pitchFamily="2" charset="-78"/>
+              </a:rPr>
+              <a:t>/</a:t>
+            </a:r>
+            <a:r>
+              <a:rPr lang="en-US" dirty="0" err="1">
+                <a:latin typeface="Tahoma" panose="020B0604030504040204" pitchFamily="34" charset="0"/>
+                <a:cs typeface="B Lotus" panose="00000400000000000000" pitchFamily="2" charset="-78"/>
+              </a:rPr>
+              <a:t>FindAll</a:t>
+            </a:r>
+            <a:r>
+              <a:rPr lang="en-US" dirty="0">
+                <a:latin typeface="Tahoma" panose="020B0604030504040204" pitchFamily="34" charset="0"/>
+                <a:cs typeface="B Lotus" panose="00000400000000000000" pitchFamily="2" charset="-78"/>
+              </a:rPr>
+              <a:t>/Exists/</a:t>
+            </a:r>
+            <a:r>
+              <a:rPr lang="en-US" dirty="0" err="1">
+                <a:latin typeface="Tahoma" panose="020B0604030504040204" pitchFamily="34" charset="0"/>
+                <a:cs typeface="B Lotus" panose="00000400000000000000" pitchFamily="2" charset="-78"/>
+              </a:rPr>
+              <a:t>TrueForAll</a:t>
+            </a:r>
+            <a:br>
+              <a:rPr lang="fa-IR" dirty="0">
+                <a:latin typeface="Tahoma" panose="020B0604030504040204" pitchFamily="34" charset="0"/>
+                <a:cs typeface="B Lotus" panose="00000400000000000000" pitchFamily="2" charset="-78"/>
+              </a:rPr>
+            </a:br>
+            <a:r>
+              <a:rPr lang="fa-IR" dirty="0">
+                <a:latin typeface="Tahoma" panose="020B0604030504040204" pitchFamily="34" charset="0"/>
+                <a:cs typeface="B Lotus" panose="00000400000000000000" pitchFamily="2" charset="-78"/>
+              </a:rPr>
+              <a:t>برای پیدا کردن یک یا چند عنصر در آرایه با دستورات شرطی</a:t>
+            </a:r>
           </a:p>
         </p:txBody>
       </p:sp>
     </p:spTree>
     <p:extLst>
       <p:ext uri="{BB962C8B-B14F-4D97-AF65-F5344CB8AC3E}">
-        <p14:creationId xmlns:p14="http://schemas.microsoft.com/office/powerpoint/2010/main" val="3742704742"/>
+        <p14:creationId xmlns:p14="http://schemas.microsoft.com/office/powerpoint/2010/main" val="1380063536"/>
+      </p:ext>
+    </p:extLst>
+  </p:cSld>
+  <p:clrMapOvr>
+    <a:masterClrMapping/>
+  </p:clrMapOvr>
+</p:sld>
+</file>
+
+<file path=ppt/slides/slide8.xml><?xml version="1.0" encoding="utf-8"?>
+<p:sld xmlns:a="http://schemas.openxmlformats.org/drawingml/2006/main" xmlns:r="http://schemas.openxmlformats.org/officeDocument/2006/relationships" xmlns:p="http://schemas.openxmlformats.org/presentationml/2006/main">
+  <p:cSld>
+    <p:spTree>
+      <p:nvGrpSpPr>
+        <p:cNvPr id="1" name=""/>
+        <p:cNvGrpSpPr/>
+        <p:nvPr/>
+      </p:nvGrpSpPr>
+      <p:grpSpPr>
+        <a:xfrm>
+          <a:off x="0" y="0"/>
+          <a:ext cx="0" cy="0"/>
+          <a:chOff x="0" y="0"/>
+          <a:chExt cx="0" cy="0"/>
+        </a:xfrm>
+      </p:grpSpPr>
+      <p:sp>
+        <p:nvSpPr>
+          <p:cNvPr id="2" name="Title 1">
+            <a:extLst>
+              <a:ext uri="{FF2B5EF4-FFF2-40B4-BE49-F238E27FC236}">
+                <a16:creationId xmlns:a16="http://schemas.microsoft.com/office/drawing/2014/main" id="{4EF72416-B3DD-920F-1E2D-AC63810A536E}"/>
+              </a:ext>
+            </a:extLst>
+          </p:cNvPr>
+          <p:cNvSpPr>
+            <a:spLocks noGrp="1"/>
+          </p:cNvSpPr>
+          <p:nvPr>
+            <p:ph type="title"/>
+          </p:nvPr>
+        </p:nvSpPr>
+        <p:spPr/>
+        <p:txBody>
+          <a:bodyPr/>
+          <a:lstStyle/>
+          <a:p>
+            <a:pPr algn="ctr"/>
+            <a:r>
+              <a:rPr lang="en-US" cap="none" dirty="0">
+                <a:latin typeface="Tahoma" panose="020B0604030504040204" pitchFamily="34" charset="0"/>
+                <a:cs typeface="B Lotus" panose="00000400000000000000" pitchFamily="2" charset="-78"/>
+              </a:rPr>
+              <a:t>Searching</a:t>
+            </a:r>
+          </a:p>
+        </p:txBody>
+      </p:sp>
+      <p:sp>
+        <p:nvSpPr>
+          <p:cNvPr id="3" name="Content Placeholder 2">
+            <a:extLst>
+              <a:ext uri="{FF2B5EF4-FFF2-40B4-BE49-F238E27FC236}">
+                <a16:creationId xmlns:a16="http://schemas.microsoft.com/office/drawing/2014/main" id="{E22DB625-3035-E58A-78AF-734BBE972FEE}"/>
+              </a:ext>
+            </a:extLst>
+          </p:cNvPr>
+          <p:cNvSpPr>
+            <a:spLocks noGrp="1"/>
+          </p:cNvSpPr>
+          <p:nvPr>
+            <p:ph idx="1"/>
+          </p:nvPr>
+        </p:nvSpPr>
+        <p:spPr/>
+        <p:txBody>
+          <a:bodyPr>
+            <a:normAutofit/>
+          </a:bodyPr>
+          <a:lstStyle/>
+          <a:p>
+            <a:pPr marL="0" indent="0" algn="r" rtl="1">
+              <a:buNone/>
+            </a:pPr>
+            <a:r>
+              <a:rPr lang="fa-IR" dirty="0">
+                <a:latin typeface="Tahoma" panose="020B0604030504040204" pitchFamily="34" charset="0"/>
+                <a:cs typeface="B Lotus" panose="00000400000000000000" pitchFamily="2" charset="-78"/>
+              </a:rPr>
+              <a:t>هیچکدوم از روش‌های جستجو در صورت پیدا نکردن آیتم مدنظر خطا نمیدند، در عوض اگر آیتمی پیدا نکنند مقدار 1- برمیگردونند.</a:t>
+            </a:r>
+            <a:endParaRPr lang="en-US" dirty="0">
+              <a:latin typeface="Tahoma" panose="020B0604030504040204" pitchFamily="34" charset="0"/>
+              <a:cs typeface="B Lotus" panose="00000400000000000000" pitchFamily="2" charset="-78"/>
+            </a:endParaRPr>
+          </a:p>
+          <a:p>
+            <a:pPr marL="0" indent="0" algn="r" rtl="1">
+              <a:buNone/>
+            </a:pPr>
+            <a:r>
+              <a:rPr lang="fa-IR" dirty="0">
+                <a:latin typeface="Tahoma" panose="020B0604030504040204" pitchFamily="34" charset="0"/>
+                <a:cs typeface="B Lotus" panose="00000400000000000000" pitchFamily="2" charset="-78"/>
+              </a:rPr>
+              <a:t>متد </a:t>
+            </a:r>
+            <a:r>
+              <a:rPr lang="en-US" dirty="0" err="1">
+                <a:latin typeface="Tahoma" panose="020B0604030504040204" pitchFamily="34" charset="0"/>
+                <a:cs typeface="B Lotus" panose="00000400000000000000" pitchFamily="2" charset="-78"/>
+              </a:rPr>
+              <a:t>binarySearch</a:t>
+            </a:r>
+            <a:r>
+              <a:rPr lang="fa-IR" dirty="0">
+                <a:latin typeface="Tahoma" panose="020B0604030504040204" pitchFamily="34" charset="0"/>
+                <a:cs typeface="B Lotus" panose="00000400000000000000" pitchFamily="2" charset="-78"/>
+              </a:rPr>
+              <a:t> سرعت بالایی داره ولی فقط میتونه با آرایه‌های مرتب کار کنه و نیاز داره که هر آیتم بتونه با آیتم قبلی مقایسه بشه. برای همین میتونه یه </a:t>
+            </a:r>
+            <a:r>
+              <a:rPr lang="en-US" dirty="0" err="1">
+                <a:latin typeface="Tahoma" panose="020B0604030504040204" pitchFamily="34" charset="0"/>
+                <a:cs typeface="B Lotus" panose="00000400000000000000" pitchFamily="2" charset="-78"/>
+              </a:rPr>
+              <a:t>Icomparer</a:t>
+            </a:r>
+            <a:r>
+              <a:rPr lang="fa-IR" dirty="0">
+                <a:latin typeface="Tahoma" panose="020B0604030504040204" pitchFamily="34" charset="0"/>
+                <a:cs typeface="B Lotus" panose="00000400000000000000" pitchFamily="2" charset="-78"/>
+              </a:rPr>
+              <a:t> به عنوان ورودیش بگیره. اگه این ورودی رو بهش ندیم با الگوریتم پیش‌فرض خودش جستجو رو انجام میده.</a:t>
+            </a:r>
+          </a:p>
+        </p:txBody>
+      </p:sp>
+      <p:pic>
+        <p:nvPicPr>
+          <p:cNvPr id="5" name="Picture 4">
+            <a:extLst>
+              <a:ext uri="{FF2B5EF4-FFF2-40B4-BE49-F238E27FC236}">
+                <a16:creationId xmlns:a16="http://schemas.microsoft.com/office/drawing/2014/main" id="{6B2037C6-9EEC-F943-0255-252D17BDAE5A}"/>
+              </a:ext>
+            </a:extLst>
+          </p:cNvPr>
+          <p:cNvPicPr>
+            <a:picLocks noChangeAspect="1"/>
+          </p:cNvPicPr>
+          <p:nvPr/>
+        </p:nvPicPr>
+        <p:blipFill>
+          <a:blip r:embed="rId2"/>
+          <a:stretch>
+            <a:fillRect/>
+          </a:stretch>
+        </p:blipFill>
+        <p:spPr>
+          <a:xfrm>
+            <a:off x="1366649" y="4862500"/>
+            <a:ext cx="7094411" cy="466738"/>
+          </a:xfrm>
+          <a:prstGeom prst="rect">
+            <a:avLst/>
+          </a:prstGeom>
+        </p:spPr>
+      </p:pic>
+    </p:spTree>
+    <p:extLst>
+      <p:ext uri="{BB962C8B-B14F-4D97-AF65-F5344CB8AC3E}">
+        <p14:creationId xmlns:p14="http://schemas.microsoft.com/office/powerpoint/2010/main" val="3844318576"/>
+      </p:ext>
+    </p:extLst>
+  </p:cSld>
+  <p:clrMapOvr>
+    <a:masterClrMapping/>
+  </p:clrMapOvr>
+</p:sld>
+</file>
+
+<file path=ppt/slides/slide9.xml><?xml version="1.0" encoding="utf-8"?>
+<p:sld xmlns:a="http://schemas.openxmlformats.org/drawingml/2006/main" xmlns:r="http://schemas.openxmlformats.org/officeDocument/2006/relationships" xmlns:p="http://schemas.openxmlformats.org/presentationml/2006/main">
+  <p:cSld>
+    <p:spTree>
+      <p:nvGrpSpPr>
+        <p:cNvPr id="1" name=""/>
+        <p:cNvGrpSpPr/>
+        <p:nvPr/>
+      </p:nvGrpSpPr>
+      <p:grpSpPr>
+        <a:xfrm>
+          <a:off x="0" y="0"/>
+          <a:ext cx="0" cy="0"/>
+          <a:chOff x="0" y="0"/>
+          <a:chExt cx="0" cy="0"/>
+        </a:xfrm>
+      </p:grpSpPr>
+      <p:sp>
+        <p:nvSpPr>
+          <p:cNvPr id="2" name="Title 1">
+            <a:extLst>
+              <a:ext uri="{FF2B5EF4-FFF2-40B4-BE49-F238E27FC236}">
+                <a16:creationId xmlns:a16="http://schemas.microsoft.com/office/drawing/2014/main" id="{4EF72416-B3DD-920F-1E2D-AC63810A536E}"/>
+              </a:ext>
+            </a:extLst>
+          </p:cNvPr>
+          <p:cNvSpPr>
+            <a:spLocks noGrp="1"/>
+          </p:cNvSpPr>
+          <p:nvPr>
+            <p:ph type="title"/>
+          </p:nvPr>
+        </p:nvSpPr>
+        <p:spPr/>
+        <p:txBody>
+          <a:bodyPr/>
+          <a:lstStyle/>
+          <a:p>
+            <a:pPr algn="ctr"/>
+            <a:r>
+              <a:rPr lang="en-US" cap="none" dirty="0">
+                <a:latin typeface="Tahoma" panose="020B0604030504040204" pitchFamily="34" charset="0"/>
+                <a:cs typeface="B Lotus" panose="00000400000000000000" pitchFamily="2" charset="-78"/>
+              </a:rPr>
+              <a:t>Searching</a:t>
+            </a:r>
+          </a:p>
+        </p:txBody>
+      </p:sp>
+      <p:sp>
+        <p:nvSpPr>
+          <p:cNvPr id="3" name="Content Placeholder 2">
+            <a:extLst>
+              <a:ext uri="{FF2B5EF4-FFF2-40B4-BE49-F238E27FC236}">
+                <a16:creationId xmlns:a16="http://schemas.microsoft.com/office/drawing/2014/main" id="{E22DB625-3035-E58A-78AF-734BBE972FEE}"/>
+              </a:ext>
+            </a:extLst>
+          </p:cNvPr>
+          <p:cNvSpPr>
+            <a:spLocks noGrp="1"/>
+          </p:cNvSpPr>
+          <p:nvPr>
+            <p:ph idx="1"/>
+          </p:nvPr>
+        </p:nvSpPr>
+        <p:spPr/>
+        <p:txBody>
+          <a:bodyPr>
+            <a:normAutofit/>
+          </a:bodyPr>
+          <a:lstStyle/>
+          <a:p>
+            <a:pPr marL="0" indent="0" algn="r" rtl="1">
+              <a:buNone/>
+            </a:pPr>
+            <a:r>
+              <a:rPr lang="fa-IR" dirty="0">
+                <a:latin typeface="Tahoma" panose="020B0604030504040204" pitchFamily="34" charset="0"/>
+                <a:cs typeface="B Lotus" panose="00000400000000000000" pitchFamily="2" charset="-78"/>
+              </a:rPr>
+              <a:t>متدهای </a:t>
+            </a:r>
+            <a:r>
+              <a:rPr lang="en-US" dirty="0" err="1">
+                <a:latin typeface="Tahoma" panose="020B0604030504040204" pitchFamily="34" charset="0"/>
+                <a:cs typeface="B Lotus" panose="00000400000000000000" pitchFamily="2" charset="-78"/>
+              </a:rPr>
+              <a:t>indexOf</a:t>
+            </a:r>
+            <a:r>
+              <a:rPr lang="fa-IR" dirty="0">
+                <a:latin typeface="Tahoma" panose="020B0604030504040204" pitchFamily="34" charset="0"/>
+                <a:cs typeface="B Lotus" panose="00000400000000000000" pitchFamily="2" charset="-78"/>
+              </a:rPr>
+              <a:t> و </a:t>
+            </a:r>
+            <a:r>
+              <a:rPr lang="en-US" dirty="0" err="1">
+                <a:latin typeface="Tahoma" panose="020B0604030504040204" pitchFamily="34" charset="0"/>
+                <a:cs typeface="B Lotus" panose="00000400000000000000" pitchFamily="2" charset="-78"/>
+              </a:rPr>
+              <a:t>lastIndexOf</a:t>
+            </a:r>
+            <a:r>
+              <a:rPr lang="fa-IR" dirty="0">
+                <a:latin typeface="Tahoma" panose="020B0604030504040204" pitchFamily="34" charset="0"/>
+                <a:cs typeface="B Lotus" panose="00000400000000000000" pitchFamily="2" charset="-78"/>
+              </a:rPr>
+              <a:t> به ترتیب اولین و آخرین ایندکس آیتم پیدا شده رو برمیگردونه.</a:t>
+            </a:r>
+            <a:endParaRPr lang="en-US" dirty="0">
+              <a:latin typeface="Tahoma" panose="020B0604030504040204" pitchFamily="34" charset="0"/>
+              <a:cs typeface="B Lotus" panose="00000400000000000000" pitchFamily="2" charset="-78"/>
+            </a:endParaRPr>
+          </a:p>
+          <a:p>
+            <a:pPr marL="0" indent="0" algn="r" rtl="1">
+              <a:buNone/>
+            </a:pPr>
+            <a:endParaRPr lang="en-US" dirty="0">
+              <a:latin typeface="Tahoma" panose="020B0604030504040204" pitchFamily="34" charset="0"/>
+              <a:cs typeface="B Lotus" panose="00000400000000000000" pitchFamily="2" charset="-78"/>
+            </a:endParaRPr>
+          </a:p>
+          <a:p>
+            <a:pPr marL="0" indent="0" algn="r" rtl="1">
+              <a:buNone/>
+            </a:pPr>
+            <a:r>
+              <a:rPr lang="fa-IR" dirty="0">
+                <a:latin typeface="Tahoma" panose="020B0604030504040204" pitchFamily="34" charset="0"/>
+                <a:cs typeface="B Lotus" panose="00000400000000000000" pitchFamily="2" charset="-78"/>
+              </a:rPr>
+              <a:t>برای استفاده از توابعی مثل </a:t>
+            </a:r>
+            <a:r>
+              <a:rPr lang="en-US" dirty="0">
+                <a:latin typeface="Tahoma" panose="020B0604030504040204" pitchFamily="34" charset="0"/>
+                <a:cs typeface="B Lotus" panose="00000400000000000000" pitchFamily="2" charset="-78"/>
+              </a:rPr>
+              <a:t>Find</a:t>
+            </a:r>
+            <a:r>
+              <a:rPr lang="fa-IR" dirty="0">
+                <a:latin typeface="Tahoma" panose="020B0604030504040204" pitchFamily="34" charset="0"/>
+                <a:cs typeface="B Lotus" panose="00000400000000000000" pitchFamily="2" charset="-78"/>
+              </a:rPr>
+              <a:t> یک متد </a:t>
+            </a:r>
+            <a:r>
+              <a:rPr lang="en-US" dirty="0">
+                <a:latin typeface="Tahoma" panose="020B0604030504040204" pitchFamily="34" charset="0"/>
+                <a:cs typeface="B Lotus" panose="00000400000000000000" pitchFamily="2" charset="-78"/>
+              </a:rPr>
+              <a:t>Predicate&lt;T&gt;</a:t>
+            </a:r>
+            <a:r>
+              <a:rPr lang="fa-IR" dirty="0">
+                <a:latin typeface="Tahoma" panose="020B0604030504040204" pitchFamily="34" charset="0"/>
+                <a:cs typeface="B Lotus" panose="00000400000000000000" pitchFamily="2" charset="-78"/>
+              </a:rPr>
+              <a:t> باید به عنوان ورودی بهش پاس بدیم.</a:t>
+            </a:r>
+          </a:p>
+        </p:txBody>
+      </p:sp>
+      <p:pic>
+        <p:nvPicPr>
+          <p:cNvPr id="6" name="Picture 5">
+            <a:extLst>
+              <a:ext uri="{FF2B5EF4-FFF2-40B4-BE49-F238E27FC236}">
+                <a16:creationId xmlns:a16="http://schemas.microsoft.com/office/drawing/2014/main" id="{871440BD-07AE-0B39-6323-E6DEE7B7695A}"/>
+              </a:ext>
+            </a:extLst>
+          </p:cNvPr>
+          <p:cNvPicPr>
+            <a:picLocks noChangeAspect="1"/>
+          </p:cNvPicPr>
+          <p:nvPr/>
+        </p:nvPicPr>
+        <p:blipFill>
+          <a:blip r:embed="rId2"/>
+          <a:stretch>
+            <a:fillRect/>
+          </a:stretch>
+        </p:blipFill>
+        <p:spPr>
+          <a:xfrm>
+            <a:off x="1400895" y="2867006"/>
+            <a:ext cx="7058811" cy="528656"/>
+          </a:xfrm>
+          <a:prstGeom prst="rect">
+            <a:avLst/>
+          </a:prstGeom>
+        </p:spPr>
+      </p:pic>
+      <p:pic>
+        <p:nvPicPr>
+          <p:cNvPr id="8" name="Picture 7">
+            <a:extLst>
+              <a:ext uri="{FF2B5EF4-FFF2-40B4-BE49-F238E27FC236}">
+                <a16:creationId xmlns:a16="http://schemas.microsoft.com/office/drawing/2014/main" id="{BD56E240-2E4D-8185-4301-A42E7A7C4C9C}"/>
+              </a:ext>
+            </a:extLst>
+          </p:cNvPr>
+          <p:cNvPicPr>
+            <a:picLocks noChangeAspect="1"/>
+          </p:cNvPicPr>
+          <p:nvPr/>
+        </p:nvPicPr>
+        <p:blipFill>
+          <a:blip r:embed="rId3"/>
+          <a:stretch>
+            <a:fillRect/>
+          </a:stretch>
+        </p:blipFill>
+        <p:spPr>
+          <a:xfrm>
+            <a:off x="1400895" y="4013181"/>
+            <a:ext cx="6319118" cy="621336"/>
+          </a:xfrm>
+          <a:prstGeom prst="rect">
+            <a:avLst/>
+          </a:prstGeom>
+        </p:spPr>
+      </p:pic>
+      <p:pic>
+        <p:nvPicPr>
+          <p:cNvPr id="11" name="Picture 10">
+            <a:extLst>
+              <a:ext uri="{FF2B5EF4-FFF2-40B4-BE49-F238E27FC236}">
+                <a16:creationId xmlns:a16="http://schemas.microsoft.com/office/drawing/2014/main" id="{E05738C3-1FB5-59CF-E532-D97D7EACFE5E}"/>
+              </a:ext>
+            </a:extLst>
+          </p:cNvPr>
+          <p:cNvPicPr>
+            <a:picLocks noChangeAspect="1"/>
+          </p:cNvPicPr>
+          <p:nvPr/>
+        </p:nvPicPr>
+        <p:blipFill>
+          <a:blip r:embed="rId4"/>
+          <a:stretch>
+            <a:fillRect/>
+          </a:stretch>
+        </p:blipFill>
+        <p:spPr>
+          <a:xfrm>
+            <a:off x="1400895" y="4834859"/>
+            <a:ext cx="9305942" cy="932847"/>
+          </a:xfrm>
+          <a:prstGeom prst="rect">
+            <a:avLst/>
+          </a:prstGeom>
+        </p:spPr>
+      </p:pic>
+    </p:spTree>
+    <p:extLst>
+      <p:ext uri="{BB962C8B-B14F-4D97-AF65-F5344CB8AC3E}">
+        <p14:creationId xmlns:p14="http://schemas.microsoft.com/office/powerpoint/2010/main" val="4188533494"/>
       </p:ext>
     </p:extLst>
   </p:cSld>

</xml_diff>